<commit_message>
Add sequence diagram to developer guide
</commit_message>
<xml_diff>
--- a/docs/diagrams/StatsUiSequenceDiagram.pptx
+++ b/docs/diagrams/StatsUiSequenceDiagram.pptx
@@ -5,10 +5,11 @@
     <p:sldMasterId id="2147483648" r:id="rId1"/>
   </p:sldMasterIdLst>
   <p:notesMasterIdLst>
-    <p:notesMasterId r:id="rId3"/>
+    <p:notesMasterId r:id="rId4"/>
   </p:notesMasterIdLst>
   <p:sldIdLst>
-    <p:sldId id="267" r:id="rId2"/>
+    <p:sldId id="268" r:id="rId2"/>
+    <p:sldId id="269" r:id="rId3"/>
   </p:sldIdLst>
   <p:sldSz cx="9144000" cy="6858000" type="screen4x3"/>
   <p:notesSz cx="6858000" cy="9144000"/>
@@ -126,10 +127,6 @@
 </p:presentation>
 </file>
 
-<file path=ppt/revisionInfo.xml><?xml version="1.0" encoding="utf-8"?>
-<p1510:revInfo xmlns:a="http://schemas.openxmlformats.org/drawingml/2006/main" xmlns:r="http://schemas.openxmlformats.org/officeDocument/2006/relationships" xmlns:p1510="http://schemas.microsoft.com/office/powerpoint/2015/10/main"/>
-</file>
-
 <file path=ppt/notesMasters/notesMaster1.xml><?xml version="1.0" encoding="utf-8"?>
 <p:notesMaster xmlns:a="http://schemas.openxmlformats.org/drawingml/2006/main" xmlns:r="http://schemas.openxmlformats.org/officeDocument/2006/relationships" xmlns:p="http://schemas.openxmlformats.org/presentationml/2006/main">
   <p:cSld>
@@ -212,7 +209,7 @@
           <a:p>
             <a:fld id="{F5CC4B3F-88C1-4FFA-B1B6-F41C21DC6924}" type="datetimeFigureOut">
               <a:rPr lang="en-US" smtClean="0"/>
-              <a:t>7/6/2018</a:t>
+              <a:t>01-Nov-18</a:t>
             </a:fld>
             <a:endParaRPr lang="en-US"/>
           </a:p>
@@ -658,7 +655,7 @@
           <a:p>
             <a:fld id="{78C97017-6FC3-485B-9764-EAC9E56C1D49}" type="datetimeFigureOut">
               <a:rPr lang="en-US" smtClean="0"/>
-              <a:t>7/6/2018</a:t>
+              <a:t>01-Nov-18</a:t>
             </a:fld>
             <a:endParaRPr lang="en-US"/>
           </a:p>
@@ -826,7 +823,7 @@
           <a:p>
             <a:fld id="{78C97017-6FC3-485B-9764-EAC9E56C1D49}" type="datetimeFigureOut">
               <a:rPr lang="en-US" smtClean="0"/>
-              <a:t>7/6/2018</a:t>
+              <a:t>01-Nov-18</a:t>
             </a:fld>
             <a:endParaRPr lang="en-US"/>
           </a:p>
@@ -1004,7 +1001,7 @@
           <a:p>
             <a:fld id="{78C97017-6FC3-485B-9764-EAC9E56C1D49}" type="datetimeFigureOut">
               <a:rPr lang="en-US" smtClean="0"/>
-              <a:t>7/6/2018</a:t>
+              <a:t>01-Nov-18</a:t>
             </a:fld>
             <a:endParaRPr lang="en-US"/>
           </a:p>
@@ -1172,7 +1169,7 @@
           <a:p>
             <a:fld id="{78C97017-6FC3-485B-9764-EAC9E56C1D49}" type="datetimeFigureOut">
               <a:rPr lang="en-US" smtClean="0"/>
-              <a:t>7/6/2018</a:t>
+              <a:t>01-Nov-18</a:t>
             </a:fld>
             <a:endParaRPr lang="en-US"/>
           </a:p>
@@ -1417,7 +1414,7 @@
           <a:p>
             <a:fld id="{78C97017-6FC3-485B-9764-EAC9E56C1D49}" type="datetimeFigureOut">
               <a:rPr lang="en-US" smtClean="0"/>
-              <a:t>7/6/2018</a:t>
+              <a:t>01-Nov-18</a:t>
             </a:fld>
             <a:endParaRPr lang="en-US"/>
           </a:p>
@@ -1702,7 +1699,7 @@
           <a:p>
             <a:fld id="{78C97017-6FC3-485B-9764-EAC9E56C1D49}" type="datetimeFigureOut">
               <a:rPr lang="en-US" smtClean="0"/>
-              <a:t>7/6/2018</a:t>
+              <a:t>01-Nov-18</a:t>
             </a:fld>
             <a:endParaRPr lang="en-US"/>
           </a:p>
@@ -2121,7 +2118,7 @@
           <a:p>
             <a:fld id="{78C97017-6FC3-485B-9764-EAC9E56C1D49}" type="datetimeFigureOut">
               <a:rPr lang="en-US" smtClean="0"/>
-              <a:t>7/6/2018</a:t>
+              <a:t>01-Nov-18</a:t>
             </a:fld>
             <a:endParaRPr lang="en-US"/>
           </a:p>
@@ -2238,7 +2235,7 @@
           <a:p>
             <a:fld id="{78C97017-6FC3-485B-9764-EAC9E56C1D49}" type="datetimeFigureOut">
               <a:rPr lang="en-US" smtClean="0"/>
-              <a:t>7/6/2018</a:t>
+              <a:t>01-Nov-18</a:t>
             </a:fld>
             <a:endParaRPr lang="en-US"/>
           </a:p>
@@ -2333,7 +2330,7 @@
           <a:p>
             <a:fld id="{78C97017-6FC3-485B-9764-EAC9E56C1D49}" type="datetimeFigureOut">
               <a:rPr lang="en-US" smtClean="0"/>
-              <a:t>7/6/2018</a:t>
+              <a:t>01-Nov-18</a:t>
             </a:fld>
             <a:endParaRPr lang="en-US"/>
           </a:p>
@@ -2608,7 +2605,7 @@
           <a:p>
             <a:fld id="{78C97017-6FC3-485B-9764-EAC9E56C1D49}" type="datetimeFigureOut">
               <a:rPr lang="en-US" smtClean="0"/>
-              <a:t>7/6/2018</a:t>
+              <a:t>01-Nov-18</a:t>
             </a:fld>
             <a:endParaRPr lang="en-US"/>
           </a:p>
@@ -2860,7 +2857,7 @@
           <a:p>
             <a:fld id="{78C97017-6FC3-485B-9764-EAC9E56C1D49}" type="datetimeFigureOut">
               <a:rPr lang="en-US" smtClean="0"/>
-              <a:t>7/6/2018</a:t>
+              <a:t>01-Nov-18</a:t>
             </a:fld>
             <a:endParaRPr lang="en-US"/>
           </a:p>
@@ -3071,7 +3068,7 @@
           <a:p>
             <a:fld id="{78C97017-6FC3-485B-9764-EAC9E56C1D49}" type="datetimeFigureOut">
               <a:rPr lang="en-US" smtClean="0"/>
-              <a:t>7/6/2018</a:t>
+              <a:t>01-Nov-18</a:t>
             </a:fld>
             <a:endParaRPr lang="en-US"/>
           </a:p>
@@ -3448,75 +3445,20 @@
       </p:grpSpPr>
       <p:sp>
         <p:nvSpPr>
-          <p:cNvPr id="56" name="Rectangle 65"/>
+          <p:cNvPr id="157" name="Rectangle 65">
+            <a:extLst>
+              <a:ext uri="{FF2B5EF4-FFF2-40B4-BE49-F238E27FC236}">
+                <a16:creationId xmlns:a16="http://schemas.microsoft.com/office/drawing/2014/main" id="{95C2667D-9C81-41B5-905B-02CDA8CB3B7D}"/>
+              </a:ext>
+            </a:extLst>
+          </p:cNvPr>
           <p:cNvSpPr/>
           <p:nvPr/>
         </p:nvSpPr>
         <p:spPr>
           <a:xfrm>
-            <a:off x="6459374" y="118895"/>
-            <a:ext cx="3903825" cy="4400926"/>
-          </a:xfrm>
-          <a:prstGeom prst="roundRect">
-            <a:avLst>
-              <a:gd name="adj" fmla="val 3484"/>
-            </a:avLst>
-          </a:prstGeom>
-          <a:solidFill>
-            <a:schemeClr val="accent4">
-              <a:lumMod val="20000"/>
-              <a:lumOff val="80000"/>
-            </a:schemeClr>
-          </a:solidFill>
-          <a:ln w="19050">
-            <a:noFill/>
-          </a:ln>
-          <a:effectLst/>
-        </p:spPr>
-        <p:style>
-          <a:lnRef idx="1">
-            <a:schemeClr val="accent2"/>
-          </a:lnRef>
-          <a:fillRef idx="2">
-            <a:schemeClr val="accent2"/>
-          </a:fillRef>
-          <a:effectRef idx="1">
-            <a:schemeClr val="accent2"/>
-          </a:effectRef>
-          <a:fontRef idx="minor">
-            <a:schemeClr val="dk1"/>
-          </a:fontRef>
-        </p:style>
-        <p:txBody>
-          <a:bodyPr rtlCol="0" anchor="t"/>
-          <a:lstStyle/>
-          <a:p>
-            <a:r>
-              <a:rPr lang="en-US" sz="1200" b="1" dirty="0">
-                <a:solidFill>
-                  <a:srgbClr val="7030A0"/>
-                </a:solidFill>
-              </a:rPr>
-              <a:t>Model</a:t>
-            </a:r>
-            <a:endParaRPr lang="en-SG" sz="1200" b="1" dirty="0">
-              <a:solidFill>
-                <a:srgbClr val="7030A0"/>
-              </a:solidFill>
-            </a:endParaRPr>
-          </a:p>
-        </p:txBody>
-      </p:sp>
-      <p:sp>
-        <p:nvSpPr>
-          <p:cNvPr id="81" name="Rectangle 65"/>
-          <p:cNvSpPr/>
-          <p:nvPr/>
-        </p:nvSpPr>
-        <p:spPr>
-          <a:xfrm>
-            <a:off x="467813" y="163018"/>
-            <a:ext cx="5863964" cy="4343400"/>
+            <a:off x="381000" y="3581400"/>
+            <a:ext cx="6672315" cy="4170151"/>
           </a:xfrm>
           <a:prstGeom prst="roundRect">
             <a:avLst>
@@ -3552,14 +3494,6 @@
           <a:bodyPr rtlCol="0" anchor="t"/>
           <a:lstStyle/>
           <a:p>
-            <a:r>
-              <a:rPr lang="en-US" sz="1200" b="1" dirty="0">
-                <a:solidFill>
-                  <a:srgbClr val="0070C0"/>
-                </a:solidFill>
-              </a:rPr>
-              <a:t>Logic</a:t>
-            </a:r>
             <a:endParaRPr lang="en-SG" sz="1200" b="1" dirty="0">
               <a:solidFill>
                 <a:srgbClr val="0070C0"/>
@@ -3570,25 +3504,28 @@
       </p:sp>
       <p:sp>
         <p:nvSpPr>
-          <p:cNvPr id="2" name="Rectangle 62"/>
+          <p:cNvPr id="81" name="Rectangle 65"/>
           <p:cNvSpPr/>
           <p:nvPr/>
         </p:nvSpPr>
         <p:spPr>
           <a:xfrm>
-            <a:off x="883145" y="543946"/>
-            <a:ext cx="1455629" cy="346760"/>
-          </a:xfrm>
-          <a:prstGeom prst="rect">
-            <a:avLst/>
+            <a:off x="338993" y="219557"/>
+            <a:ext cx="2454179" cy="7552833"/>
+          </a:xfrm>
+          <a:prstGeom prst="roundRect">
+            <a:avLst>
+              <a:gd name="adj" fmla="val 3484"/>
+            </a:avLst>
           </a:prstGeom>
           <a:solidFill>
-            <a:srgbClr val="0070C0"/>
+            <a:schemeClr val="accent1">
+              <a:lumMod val="20000"/>
+              <a:lumOff val="80000"/>
+            </a:schemeClr>
           </a:solidFill>
           <a:ln w="19050">
-            <a:solidFill>
-              <a:srgbClr val="0070C0"/>
-            </a:solidFill>
+            <a:noFill/>
           </a:ln>
           <a:effectLst/>
         </p:spPr>
@@ -3607,6 +3544,64 @@
           </a:fontRef>
         </p:style>
         <p:txBody>
+          <a:bodyPr rtlCol="0" anchor="t"/>
+          <a:lstStyle/>
+          <a:p>
+            <a:r>
+              <a:rPr lang="en-US" sz="1200" b="1" dirty="0">
+                <a:solidFill>
+                  <a:srgbClr val="0070C0"/>
+                </a:solidFill>
+              </a:rPr>
+              <a:t>UI</a:t>
+            </a:r>
+            <a:endParaRPr lang="en-SG" sz="1200" b="1" dirty="0">
+              <a:solidFill>
+                <a:srgbClr val="0070C0"/>
+              </a:solidFill>
+            </a:endParaRPr>
+          </a:p>
+        </p:txBody>
+      </p:sp>
+      <p:sp>
+        <p:nvSpPr>
+          <p:cNvPr id="2" name="Rectangle 62"/>
+          <p:cNvSpPr/>
+          <p:nvPr/>
+        </p:nvSpPr>
+        <p:spPr>
+          <a:xfrm>
+            <a:off x="883145" y="543946"/>
+            <a:ext cx="1455629" cy="346760"/>
+          </a:xfrm>
+          <a:prstGeom prst="rect">
+            <a:avLst/>
+          </a:prstGeom>
+          <a:solidFill>
+            <a:srgbClr val="0070C0"/>
+          </a:solidFill>
+          <a:ln w="19050">
+            <a:solidFill>
+              <a:srgbClr val="0070C0"/>
+            </a:solidFill>
+          </a:ln>
+          <a:effectLst/>
+        </p:spPr>
+        <p:style>
+          <a:lnRef idx="1">
+            <a:schemeClr val="accent2"/>
+          </a:lnRef>
+          <a:fillRef idx="2">
+            <a:schemeClr val="accent2"/>
+          </a:fillRef>
+          <a:effectRef idx="1">
+            <a:schemeClr val="accent2"/>
+          </a:effectRef>
+          <a:fontRef idx="minor">
+            <a:schemeClr val="dk1"/>
+          </a:fontRef>
+        </p:style>
+        <p:txBody>
           <a:bodyPr rtlCol="0" anchor="ctr"/>
           <a:lstStyle/>
           <a:p>
@@ -3625,7 +3620,7 @@
                   <a:schemeClr val="bg1"/>
                 </a:solidFill>
               </a:rPr>
-              <a:t>LogicManager</a:t>
+              <a:t>MainWindow</a:t>
             </a:r>
             <a:endParaRPr lang="en-SG" sz="1600" dirty="0">
               <a:solidFill>
@@ -3645,8 +3640,8 @@
         </p:nvCxnSpPr>
         <p:spPr>
           <a:xfrm>
-            <a:off x="1610959" y="907617"/>
-            <a:ext cx="0" cy="3481399"/>
+            <a:off x="1600983" y="890706"/>
+            <a:ext cx="0" cy="6576894"/>
           </a:xfrm>
           <a:prstGeom prst="line">
             <a:avLst/>
@@ -3682,8 +3677,8 @@
         </p:nvSpPr>
         <p:spPr>
           <a:xfrm>
-            <a:off x="1538951" y="1258311"/>
-            <a:ext cx="152400" cy="2932689"/>
+            <a:off x="1532878" y="1421486"/>
+            <a:ext cx="136211" cy="2852928"/>
           </a:xfrm>
           <a:prstGeom prst="rect">
             <a:avLst/>
@@ -3721,254 +3716,6 @@
           </a:p>
         </p:txBody>
       </p:sp>
-      <p:sp>
-        <p:nvSpPr>
-          <p:cNvPr id="16" name="Rectangle 62"/>
-          <p:cNvSpPr/>
-          <p:nvPr/>
-        </p:nvSpPr>
-        <p:spPr>
-          <a:xfrm>
-            <a:off x="3437188" y="423022"/>
-            <a:ext cx="1219200" cy="467684"/>
-          </a:xfrm>
-          <a:prstGeom prst="rect">
-            <a:avLst/>
-          </a:prstGeom>
-          <a:solidFill>
-            <a:srgbClr val="0070C0"/>
-          </a:solidFill>
-          <a:ln w="19050">
-            <a:solidFill>
-              <a:srgbClr val="0070C0"/>
-            </a:solidFill>
-          </a:ln>
-          <a:effectLst/>
-        </p:spPr>
-        <p:style>
-          <a:lnRef idx="1">
-            <a:schemeClr val="accent2"/>
-          </a:lnRef>
-          <a:fillRef idx="2">
-            <a:schemeClr val="accent2"/>
-          </a:fillRef>
-          <a:effectRef idx="1">
-            <a:schemeClr val="accent2"/>
-          </a:effectRef>
-          <a:fontRef idx="minor">
-            <a:schemeClr val="dk1"/>
-          </a:fontRef>
-        </p:style>
-        <p:txBody>
-          <a:bodyPr rtlCol="0" anchor="ctr"/>
-          <a:lstStyle/>
-          <a:p>
-            <a:pPr algn="ctr"/>
-            <a:r>
-              <a:rPr lang="en-US" sz="1600" dirty="0">
-                <a:solidFill>
-                  <a:schemeClr val="bg1"/>
-                </a:solidFill>
-              </a:rPr>
-              <a:t>:Address</a:t>
-            </a:r>
-          </a:p>
-          <a:p>
-            <a:pPr algn="ctr"/>
-            <a:r>
-              <a:rPr lang="en-US" sz="1600" dirty="0" err="1">
-                <a:solidFill>
-                  <a:schemeClr val="bg1"/>
-                </a:solidFill>
-              </a:rPr>
-              <a:t>BookParser</a:t>
-            </a:r>
-            <a:endParaRPr lang="en-SG" sz="1600" dirty="0">
-              <a:solidFill>
-                <a:schemeClr val="bg1"/>
-              </a:solidFill>
-            </a:endParaRPr>
-          </a:p>
-        </p:txBody>
-      </p:sp>
-      <p:cxnSp>
-        <p:nvCxnSpPr>
-          <p:cNvPr id="17" name="Straight Connector 16"/>
-          <p:cNvCxnSpPr>
-            <a:cxnSpLocks/>
-          </p:cNvCxnSpPr>
-          <p:nvPr/>
-        </p:nvCxnSpPr>
-        <p:spPr>
-          <a:xfrm>
-            <a:off x="4050587" y="907617"/>
-            <a:ext cx="0" cy="1482984"/>
-          </a:xfrm>
-          <a:prstGeom prst="line">
-            <a:avLst/>
-          </a:prstGeom>
-          <a:ln w="19050">
-            <a:solidFill>
-              <a:srgbClr val="0070C0"/>
-            </a:solidFill>
-            <a:prstDash val="sysDash"/>
-          </a:ln>
-          <a:effectLst/>
-        </p:spPr>
-        <p:style>
-          <a:lnRef idx="1">
-            <a:schemeClr val="accent1"/>
-          </a:lnRef>
-          <a:fillRef idx="2">
-            <a:schemeClr val="accent1"/>
-          </a:fillRef>
-          <a:effectRef idx="1">
-            <a:schemeClr val="accent1"/>
-          </a:effectRef>
-          <a:fontRef idx="minor">
-            <a:schemeClr val="dk1"/>
-          </a:fontRef>
-        </p:style>
-      </p:cxnSp>
-      <p:sp>
-        <p:nvSpPr>
-          <p:cNvPr id="18" name="Rectangle 17"/>
-          <p:cNvSpPr/>
-          <p:nvPr/>
-        </p:nvSpPr>
-        <p:spPr>
-          <a:xfrm>
-            <a:off x="3978580" y="1365810"/>
-            <a:ext cx="154408" cy="767790"/>
-          </a:xfrm>
-          <a:prstGeom prst="rect">
-            <a:avLst/>
-          </a:prstGeom>
-          <a:solidFill>
-            <a:srgbClr val="0070C0"/>
-          </a:solidFill>
-          <a:ln>
-            <a:solidFill>
-              <a:srgbClr val="0070C0"/>
-            </a:solidFill>
-          </a:ln>
-          <a:effectLst/>
-        </p:spPr>
-        <p:style>
-          <a:lnRef idx="1">
-            <a:schemeClr val="accent3"/>
-          </a:lnRef>
-          <a:fillRef idx="2">
-            <a:schemeClr val="accent3"/>
-          </a:fillRef>
-          <a:effectRef idx="1">
-            <a:schemeClr val="accent3"/>
-          </a:effectRef>
-          <a:fontRef idx="minor">
-            <a:schemeClr val="dk1"/>
-          </a:fontRef>
-        </p:style>
-        <p:txBody>
-          <a:bodyPr rtlCol="0" anchor="ctr"/>
-          <a:lstStyle/>
-          <a:p>
-            <a:pPr algn="ctr"/>
-            <a:endParaRPr lang="en-SG" sz="1400">
-              <a:solidFill>
-                <a:schemeClr val="dk1"/>
-              </a:solidFill>
-            </a:endParaRPr>
-          </a:p>
-        </p:txBody>
-      </p:sp>
-      <p:cxnSp>
-        <p:nvCxnSpPr>
-          <p:cNvPr id="20" name="Straight Connector 19"/>
-          <p:cNvCxnSpPr>
-            <a:cxnSpLocks/>
-            <a:stCxn id="21" idx="0"/>
-            <a:endCxn id="4" idx="0"/>
-          </p:cNvCxnSpPr>
-          <p:nvPr/>
-        </p:nvCxnSpPr>
-        <p:spPr>
-          <a:xfrm>
-            <a:off x="5602082" y="1613633"/>
-            <a:ext cx="0" cy="2644578"/>
-          </a:xfrm>
-          <a:prstGeom prst="line">
-            <a:avLst/>
-          </a:prstGeom>
-          <a:ln w="19050">
-            <a:solidFill>
-              <a:srgbClr val="0070C0"/>
-            </a:solidFill>
-            <a:prstDash val="sysDash"/>
-          </a:ln>
-          <a:effectLst/>
-        </p:spPr>
-        <p:style>
-          <a:lnRef idx="1">
-            <a:schemeClr val="accent1"/>
-          </a:lnRef>
-          <a:fillRef idx="2">
-            <a:schemeClr val="accent1"/>
-          </a:fillRef>
-          <a:effectRef idx="1">
-            <a:schemeClr val="accent1"/>
-          </a:effectRef>
-          <a:fontRef idx="minor">
-            <a:schemeClr val="dk1"/>
-          </a:fontRef>
-        </p:style>
-      </p:cxnSp>
-      <p:sp>
-        <p:nvSpPr>
-          <p:cNvPr id="21" name="Rectangle 20"/>
-          <p:cNvSpPr/>
-          <p:nvPr/>
-        </p:nvSpPr>
-        <p:spPr>
-          <a:xfrm>
-            <a:off x="5525882" y="1613633"/>
-            <a:ext cx="152400" cy="276003"/>
-          </a:xfrm>
-          <a:prstGeom prst="rect">
-            <a:avLst/>
-          </a:prstGeom>
-          <a:solidFill>
-            <a:srgbClr val="0070C0"/>
-          </a:solidFill>
-          <a:ln>
-            <a:solidFill>
-              <a:srgbClr val="0070C0"/>
-            </a:solidFill>
-          </a:ln>
-          <a:effectLst/>
-        </p:spPr>
-        <p:style>
-          <a:lnRef idx="1">
-            <a:schemeClr val="accent3"/>
-          </a:lnRef>
-          <a:fillRef idx="2">
-            <a:schemeClr val="accent3"/>
-          </a:fillRef>
-          <a:effectRef idx="1">
-            <a:schemeClr val="accent3"/>
-          </a:effectRef>
-          <a:fontRef idx="minor">
-            <a:schemeClr val="dk1"/>
-          </a:fontRef>
-        </p:style>
-        <p:txBody>
-          <a:bodyPr rtlCol="0" anchor="ctr"/>
-          <a:lstStyle/>
-          <a:p>
-            <a:pPr algn="ctr"/>
-            <a:endParaRPr lang="en-SG" sz="1400"/>
-          </a:p>
-        </p:txBody>
-      </p:sp>
       <p:cxnSp>
         <p:nvCxnSpPr>
           <p:cNvPr id="23" name="Straight Arrow Connector 22"/>
@@ -3977,7 +3724,7 @@
         </p:nvCxnSpPr>
         <p:spPr>
           <a:xfrm>
-            <a:off x="419100" y="1261999"/>
+            <a:off x="419100" y="1447800"/>
             <a:ext cx="1119851" cy="0"/>
           </a:xfrm>
           <a:prstGeom prst="straightConnector1">
@@ -4013,8 +3760,8 @@
         </p:nvSpPr>
         <p:spPr>
           <a:xfrm>
-            <a:off x="38100" y="990600"/>
-            <a:ext cx="1424846" cy="215444"/>
+            <a:off x="99154" y="1202323"/>
+            <a:ext cx="1424846" cy="169277"/>
           </a:xfrm>
           <a:prstGeom prst="rect">
             <a:avLst/>
@@ -4029,62 +3776,34 @@
           <a:p>
             <a:pPr algn="r"/>
             <a:r>
-              <a:rPr lang="en-US" sz="1400" dirty="0">
+              <a:rPr lang="en-US" sz="1100" dirty="0" err="1">
                 <a:solidFill>
                   <a:srgbClr val="0070C0"/>
                 </a:solidFill>
               </a:rPr>
-              <a:t>execute(“undo”)</a:t>
-            </a:r>
-          </a:p>
-        </p:txBody>
-      </p:sp>
-      <p:cxnSp>
-        <p:nvCxnSpPr>
-          <p:cNvPr id="28" name="Straight Arrow Connector 27"/>
-          <p:cNvCxnSpPr/>
-          <p:nvPr/>
-        </p:nvCxnSpPr>
-        <p:spPr>
-          <a:xfrm flipV="1">
-            <a:off x="4135972" y="1512340"/>
-            <a:ext cx="922392" cy="1"/>
-          </a:xfrm>
-          <a:prstGeom prst="straightConnector1">
-            <a:avLst/>
-          </a:prstGeom>
-          <a:ln w="19050">
-            <a:solidFill>
-              <a:srgbClr val="0070C0"/>
-            </a:solidFill>
-            <a:tailEnd type="arrow"/>
-          </a:ln>
-        </p:spPr>
-        <p:style>
-          <a:lnRef idx="1">
-            <a:schemeClr val="accent1"/>
-          </a:lnRef>
-          <a:fillRef idx="0">
-            <a:schemeClr val="accent1"/>
-          </a:fillRef>
-          <a:effectRef idx="0">
-            <a:schemeClr val="accent1"/>
-          </a:effectRef>
-          <a:fontRef idx="minor">
-            <a:schemeClr val="tx1"/>
-          </a:fontRef>
-        </p:style>
-      </p:cxnSp>
-      <p:sp>
-        <p:nvSpPr>
-          <p:cNvPr id="29" name="TextBox 28"/>
+              <a:t>handleShowStatsEvent</a:t>
+            </a:r>
+            <a:r>
+              <a:rPr lang="en-US" sz="1100" dirty="0">
+                <a:solidFill>
+                  <a:srgbClr val="0070C0"/>
+                </a:solidFill>
+              </a:rPr>
+              <a:t>()</a:t>
+            </a:r>
+          </a:p>
+        </p:txBody>
+      </p:sp>
+      <p:sp>
+        <p:nvSpPr>
+          <p:cNvPr id="80" name="TextBox 79"/>
           <p:cNvSpPr txBox="1"/>
           <p:nvPr/>
         </p:nvSpPr>
         <p:spPr>
           <a:xfrm>
-            <a:off x="3243421" y="2484071"/>
-            <a:ext cx="855809" cy="215444"/>
+            <a:off x="1614333" y="1182350"/>
+            <a:ext cx="1899551" cy="215444"/>
           </a:xfrm>
           <a:prstGeom prst="rect">
             <a:avLst/>
@@ -4108,23 +3827,44 @@
             </a:lvl1pPr>
           </a:lstStyle>
           <a:p>
-            <a:r>
-              <a:rPr lang="en-US" dirty="0"/>
-              <a:t>execute()</a:t>
+            <a:pPr algn="ctr"/>
+            <a:r>
+              <a:rPr lang="en-US" dirty="0" err="1">
+                <a:solidFill>
+                  <a:srgbClr val="7030A0"/>
+                </a:solidFill>
+              </a:rPr>
+              <a:t>getExpenseStats</a:t>
+            </a:r>
+            <a:r>
+              <a:rPr lang="en-US" dirty="0">
+                <a:solidFill>
+                  <a:srgbClr val="7030A0"/>
+                </a:solidFill>
+              </a:rPr>
+              <a:t>()</a:t>
             </a:r>
           </a:p>
         </p:txBody>
       </p:sp>
       <p:cxnSp>
         <p:nvCxnSpPr>
-          <p:cNvPr id="34" name="Straight Arrow Connector 33"/>
-          <p:cNvCxnSpPr/>
+          <p:cNvPr id="67" name="Straight Arrow Connector 66">
+            <a:extLst>
+              <a:ext uri="{FF2B5EF4-FFF2-40B4-BE49-F238E27FC236}">
+                <a16:creationId xmlns:a16="http://schemas.microsoft.com/office/drawing/2014/main" id="{D881596E-177C-4FDC-8E60-CAB90B3D5FAB}"/>
+              </a:ext>
+            </a:extLst>
+          </p:cNvPr>
+          <p:cNvCxnSpPr>
+            <a:cxnSpLocks/>
+          </p:cNvCxnSpPr>
           <p:nvPr/>
         </p:nvCxnSpPr>
         <p:spPr>
           <a:xfrm>
-            <a:off x="4109108" y="1878232"/>
-            <a:ext cx="1492974" cy="0"/>
+            <a:off x="1708245" y="1440118"/>
+            <a:ext cx="1786035" cy="0"/>
           </a:xfrm>
           <a:prstGeom prst="straightConnector1">
             <a:avLst/>
@@ -4133,9 +3873,7 @@
             <a:solidFill>
               <a:srgbClr val="0070C0"/>
             </a:solidFill>
-            <a:prstDash val="sysDash"/>
-            <a:headEnd type="arrow" w="med" len="med"/>
-            <a:tailEnd type="none" w="med" len="med"/>
+            <a:tailEnd type="arrow"/>
           </a:ln>
         </p:spPr>
         <p:style>
@@ -4155,7 +3893,13 @@
       </p:cxnSp>
       <p:cxnSp>
         <p:nvCxnSpPr>
-          <p:cNvPr id="35" name="Straight Arrow Connector 34"/>
+          <p:cNvPr id="43" name="Straight Arrow Connector 42">
+            <a:extLst>
+              <a:ext uri="{FF2B5EF4-FFF2-40B4-BE49-F238E27FC236}">
+                <a16:creationId xmlns:a16="http://schemas.microsoft.com/office/drawing/2014/main" id="{593C8532-4322-49B2-8882-68353A03BC68}"/>
+              </a:ext>
+            </a:extLst>
+          </p:cNvPr>
           <p:cNvCxnSpPr>
             <a:cxnSpLocks/>
           </p:cNvCxnSpPr>
@@ -4163,15 +3907,15 @@
         </p:nvCxnSpPr>
         <p:spPr>
           <a:xfrm>
-            <a:off x="1691351" y="2133600"/>
-            <a:ext cx="2348067" cy="0"/>
+            <a:off x="1690533" y="1676400"/>
+            <a:ext cx="1803747" cy="0"/>
           </a:xfrm>
           <a:prstGeom prst="straightConnector1">
             <a:avLst/>
           </a:prstGeom>
           <a:ln w="19050">
             <a:solidFill>
-              <a:srgbClr val="0070C0"/>
+              <a:srgbClr val="7030A0"/>
             </a:solidFill>
             <a:prstDash val="sysDash"/>
             <a:headEnd type="arrow" w="med" len="med"/>
@@ -4193,101 +3937,22 @@
           </a:fontRef>
         </p:style>
       </p:cxnSp>
-      <p:cxnSp>
-        <p:nvCxnSpPr>
-          <p:cNvPr id="37" name="Straight Arrow Connector 36"/>
-          <p:cNvCxnSpPr/>
-          <p:nvPr/>
-        </p:nvCxnSpPr>
-        <p:spPr>
-          <a:xfrm>
-            <a:off x="380999" y="4191000"/>
-            <a:ext cx="1196051" cy="0"/>
-          </a:xfrm>
-          <a:prstGeom prst="straightConnector1">
-            <a:avLst/>
-          </a:prstGeom>
-          <a:ln w="19050">
-            <a:solidFill>
-              <a:schemeClr val="accent1"/>
-            </a:solidFill>
-            <a:prstDash val="sysDash"/>
-            <a:headEnd type="arrow" w="med" len="med"/>
-            <a:tailEnd type="none" w="med" len="med"/>
-          </a:ln>
-        </p:spPr>
-        <p:style>
-          <a:lnRef idx="1">
-            <a:schemeClr val="accent1"/>
-          </a:lnRef>
-          <a:fillRef idx="0">
-            <a:schemeClr val="accent1"/>
-          </a:fillRef>
-          <a:effectRef idx="0">
-            <a:schemeClr val="accent1"/>
-          </a:effectRef>
-          <a:fontRef idx="minor">
-            <a:schemeClr val="tx1"/>
-          </a:fontRef>
-        </p:style>
-      </p:cxnSp>
-      <p:sp>
-        <p:nvSpPr>
-          <p:cNvPr id="65" name="Rectangle 64"/>
-          <p:cNvSpPr/>
-          <p:nvPr/>
-        </p:nvSpPr>
-        <p:spPr>
-          <a:xfrm>
-            <a:off x="5526488" y="2731313"/>
-            <a:ext cx="161322" cy="1307285"/>
-          </a:xfrm>
-          <a:prstGeom prst="rect">
-            <a:avLst/>
-          </a:prstGeom>
-          <a:solidFill>
-            <a:srgbClr val="0070C0"/>
-          </a:solidFill>
-          <a:ln>
-            <a:solidFill>
-              <a:srgbClr val="0070C0"/>
-            </a:solidFill>
-          </a:ln>
-          <a:effectLst/>
-        </p:spPr>
-        <p:style>
-          <a:lnRef idx="1">
-            <a:schemeClr val="accent3"/>
-          </a:lnRef>
-          <a:fillRef idx="2">
-            <a:schemeClr val="accent3"/>
-          </a:fillRef>
-          <a:effectRef idx="1">
-            <a:schemeClr val="accent3"/>
-          </a:effectRef>
-          <a:fontRef idx="minor">
-            <a:schemeClr val="dk1"/>
-          </a:fontRef>
-        </p:style>
-        <p:txBody>
-          <a:bodyPr rtlCol="0" anchor="ctr"/>
-          <a:lstStyle/>
-          <a:p>
-            <a:pPr algn="ctr"/>
-            <a:endParaRPr lang="en-SG" sz="1400"/>
-          </a:p>
-        </p:txBody>
-      </p:sp>
-      <p:sp>
-        <p:nvSpPr>
-          <p:cNvPr id="79" name="TextBox 78"/>
+      <p:sp>
+        <p:nvSpPr>
+          <p:cNvPr id="44" name="TextBox 43">
+            <a:extLst>
+              <a:ext uri="{FF2B5EF4-FFF2-40B4-BE49-F238E27FC236}">
+                <a16:creationId xmlns:a16="http://schemas.microsoft.com/office/drawing/2014/main" id="{D24D7C5B-C1DA-47EC-9BFA-1D04F6A490F2}"/>
+              </a:ext>
+            </a:extLst>
+          </p:cNvPr>
           <p:cNvSpPr txBox="1"/>
           <p:nvPr/>
         </p:nvSpPr>
         <p:spPr>
           <a:xfrm>
-            <a:off x="5651548" y="2748246"/>
-            <a:ext cx="1298078" cy="184666"/>
+            <a:off x="1600200" y="1715750"/>
+            <a:ext cx="1899551" cy="215444"/>
           </a:xfrm>
           <a:prstGeom prst="rect">
             <a:avLst/>
@@ -4311,45 +3976,41 @@
             </a:lvl1pPr>
           </a:lstStyle>
           <a:p>
-            <a:r>
-              <a:rPr lang="en-US" sz="1200" dirty="0" err="1">
-                <a:solidFill>
-                  <a:schemeClr val="accent4">
-                    <a:lumMod val="75000"/>
-                  </a:schemeClr>
-                </a:solidFill>
-              </a:rPr>
-              <a:t>undo</a:t>
-            </a:r>
-            <a:r>
-              <a:rPr lang="en-US" sz="1200" dirty="0" err="1">
+            <a:pPr algn="ctr"/>
+            <a:r>
+              <a:rPr lang="en-US" dirty="0" err="1">
                 <a:solidFill>
                   <a:srgbClr val="7030A0"/>
                 </a:solidFill>
               </a:rPr>
-              <a:t>AddressBook</a:t>
-            </a:r>
-            <a:r>
-              <a:rPr lang="en-US" sz="1200" dirty="0">
+              <a:t>getStatsPeriod</a:t>
+            </a:r>
+            <a:r>
+              <a:rPr lang="en-US" dirty="0">
                 <a:solidFill>
                   <a:srgbClr val="7030A0"/>
                 </a:solidFill>
               </a:rPr>
               <a:t>()</a:t>
             </a:r>
-            <a:endParaRPr lang="en-US" sz="1200" dirty="0"/>
-          </a:p>
-        </p:txBody>
-      </p:sp>
-      <p:sp>
-        <p:nvSpPr>
-          <p:cNvPr id="80" name="TextBox 79"/>
+          </a:p>
+        </p:txBody>
+      </p:sp>
+      <p:sp>
+        <p:nvSpPr>
+          <p:cNvPr id="48" name="TextBox 47">
+            <a:extLst>
+              <a:ext uri="{FF2B5EF4-FFF2-40B4-BE49-F238E27FC236}">
+                <a16:creationId xmlns:a16="http://schemas.microsoft.com/office/drawing/2014/main" id="{14432737-A1D7-4EAD-8D67-8DD4FA56B496}"/>
+              </a:ext>
+            </a:extLst>
+          </p:cNvPr>
           <p:cNvSpPr txBox="1"/>
           <p:nvPr/>
         </p:nvSpPr>
         <p:spPr>
           <a:xfrm>
-            <a:off x="1885189" y="1106150"/>
+            <a:off x="1600200" y="2325350"/>
             <a:ext cx="1899551" cy="215444"/>
           </a:xfrm>
           <a:prstGeom prst="rect">
@@ -4374,27 +4035,42 @@
             </a:lvl1pPr>
           </a:lstStyle>
           <a:p>
-            <a:r>
-              <a:rPr lang="en-US" dirty="0" err="1"/>
-              <a:t>parseCommand</a:t>
-            </a:r>
-            <a:r>
-              <a:rPr lang="en-US" dirty="0"/>
-              <a:t>(“undo”)</a:t>
-            </a:r>
-          </a:p>
-        </p:txBody>
-      </p:sp>
-      <p:sp>
-        <p:nvSpPr>
-          <p:cNvPr id="82" name="TextBox 81"/>
+            <a:pPr algn="ctr"/>
+            <a:r>
+              <a:rPr lang="en-US" dirty="0" err="1">
+                <a:solidFill>
+                  <a:srgbClr val="7030A0"/>
+                </a:solidFill>
+              </a:rPr>
+              <a:t>getStatsMode</a:t>
+            </a:r>
+            <a:r>
+              <a:rPr lang="en-US" dirty="0">
+                <a:solidFill>
+                  <a:srgbClr val="7030A0"/>
+                </a:solidFill>
+              </a:rPr>
+              <a:t>()</a:t>
+            </a:r>
+          </a:p>
+        </p:txBody>
+      </p:sp>
+      <p:sp>
+        <p:nvSpPr>
+          <p:cNvPr id="54" name="TextBox 53">
+            <a:extLst>
+              <a:ext uri="{FF2B5EF4-FFF2-40B4-BE49-F238E27FC236}">
+                <a16:creationId xmlns:a16="http://schemas.microsoft.com/office/drawing/2014/main" id="{558200D1-82FC-4862-B95A-FDBA6837FE4C}"/>
+              </a:ext>
+            </a:extLst>
+          </p:cNvPr>
           <p:cNvSpPr txBox="1"/>
           <p:nvPr/>
         </p:nvSpPr>
         <p:spPr>
           <a:xfrm>
-            <a:off x="3272755" y="3791076"/>
-            <a:ext cx="621216" cy="215444"/>
+            <a:off x="1600200" y="2934950"/>
+            <a:ext cx="1899551" cy="215444"/>
           </a:xfrm>
           <a:prstGeom prst="rect">
             <a:avLst/>
@@ -4418,23 +4094,42 @@
             </a:lvl1pPr>
           </a:lstStyle>
           <a:p>
-            <a:r>
-              <a:rPr lang="en-US" dirty="0"/>
-              <a:t>result</a:t>
-            </a:r>
-          </a:p>
-        </p:txBody>
-      </p:sp>
-      <p:sp>
-        <p:nvSpPr>
-          <p:cNvPr id="83" name="TextBox 82"/>
+            <a:pPr algn="ctr"/>
+            <a:r>
+              <a:rPr lang="en-US" dirty="0" err="1">
+                <a:solidFill>
+                  <a:srgbClr val="7030A0"/>
+                </a:solidFill>
+              </a:rPr>
+              <a:t>getPeriodAmount</a:t>
+            </a:r>
+            <a:r>
+              <a:rPr lang="en-US" dirty="0">
+                <a:solidFill>
+                  <a:srgbClr val="7030A0"/>
+                </a:solidFill>
+              </a:rPr>
+              <a:t>()</a:t>
+            </a:r>
+          </a:p>
+        </p:txBody>
+      </p:sp>
+      <p:sp>
+        <p:nvSpPr>
+          <p:cNvPr id="59" name="TextBox 58">
+            <a:extLst>
+              <a:ext uri="{FF2B5EF4-FFF2-40B4-BE49-F238E27FC236}">
+                <a16:creationId xmlns:a16="http://schemas.microsoft.com/office/drawing/2014/main" id="{C57072B0-3CFE-4811-B117-79F9E9CA7D54}"/>
+              </a:ext>
+            </a:extLst>
+          </p:cNvPr>
           <p:cNvSpPr txBox="1"/>
           <p:nvPr/>
         </p:nvSpPr>
         <p:spPr>
           <a:xfrm>
-            <a:off x="645270" y="3945901"/>
-            <a:ext cx="762000" cy="215444"/>
+            <a:off x="1524000" y="4009431"/>
+            <a:ext cx="1899551" cy="215444"/>
           </a:xfrm>
           <a:prstGeom prst="rect">
             <a:avLst/>
@@ -4458,33 +4153,88 @@
             </a:lvl1pPr>
           </a:lstStyle>
           <a:p>
+            <a:pPr algn="ctr"/>
+            <a:r>
+              <a:rPr lang="en-US" dirty="0" err="1"/>
+              <a:t>setData</a:t>
+            </a:r>
             <a:r>
               <a:rPr lang="en-US" dirty="0"/>
-              <a:t>result</a:t>
-            </a:r>
-          </a:p>
-        </p:txBody>
-      </p:sp>
-      <p:sp>
-        <p:nvSpPr>
-          <p:cNvPr id="84" name="Rectangle 62"/>
+              <a:t>()</a:t>
+            </a:r>
+          </a:p>
+        </p:txBody>
+      </p:sp>
+      <p:cxnSp>
+        <p:nvCxnSpPr>
+          <p:cNvPr id="61" name="Straight Arrow Connector 60">
+            <a:extLst>
+              <a:ext uri="{FF2B5EF4-FFF2-40B4-BE49-F238E27FC236}">
+                <a16:creationId xmlns:a16="http://schemas.microsoft.com/office/drawing/2014/main" id="{40AC0D0B-15BF-4F60-8BF9-9EB94FBA03AA}"/>
+              </a:ext>
+            </a:extLst>
+          </p:cNvPr>
+          <p:cNvCxnSpPr>
+            <a:cxnSpLocks/>
+          </p:cNvCxnSpPr>
+          <p:nvPr/>
+        </p:nvCxnSpPr>
+        <p:spPr>
+          <a:xfrm>
+            <a:off x="1705695" y="4267199"/>
+            <a:ext cx="1808189" cy="0"/>
+          </a:xfrm>
+          <a:prstGeom prst="straightConnector1">
+            <a:avLst/>
+          </a:prstGeom>
+          <a:ln w="19050">
+            <a:solidFill>
+              <a:srgbClr val="0070C0"/>
+            </a:solidFill>
+            <a:tailEnd type="arrow"/>
+          </a:ln>
+        </p:spPr>
+        <p:style>
+          <a:lnRef idx="1">
+            <a:schemeClr val="accent1"/>
+          </a:lnRef>
+          <a:fillRef idx="0">
+            <a:schemeClr val="accent1"/>
+          </a:fillRef>
+          <a:effectRef idx="0">
+            <a:schemeClr val="accent1"/>
+          </a:effectRef>
+          <a:fontRef idx="minor">
+            <a:schemeClr val="tx1"/>
+          </a:fontRef>
+        </p:style>
+      </p:cxnSp>
+      <p:sp>
+        <p:nvSpPr>
+          <p:cNvPr id="62" name="Rectangle 62">
+            <a:extLst>
+              <a:ext uri="{FF2B5EF4-FFF2-40B4-BE49-F238E27FC236}">
+                <a16:creationId xmlns:a16="http://schemas.microsoft.com/office/drawing/2014/main" id="{CFD07C60-6E44-4F91-8786-D4F7900CA901}"/>
+              </a:ext>
+            </a:extLst>
+          </p:cNvPr>
           <p:cNvSpPr/>
           <p:nvPr/>
         </p:nvSpPr>
         <p:spPr>
           <a:xfrm>
-            <a:off x="7497155" y="2568606"/>
-            <a:ext cx="2181777" cy="335427"/>
+            <a:off x="2854912" y="3733800"/>
+            <a:ext cx="1455629" cy="346760"/>
           </a:xfrm>
           <a:prstGeom prst="rect">
             <a:avLst/>
           </a:prstGeom>
           <a:solidFill>
-            <a:srgbClr val="7030A0"/>
+            <a:srgbClr val="0070C0"/>
           </a:solidFill>
           <a:ln w="19050">
             <a:solidFill>
-              <a:srgbClr val="7030A0"/>
+              <a:srgbClr val="0070C0"/>
             </a:solidFill>
           </a:ln>
           <a:effectLst/>
@@ -4522,7 +4272,7 @@
                   <a:schemeClr val="bg1"/>
                 </a:solidFill>
               </a:rPr>
-              <a:t>VersionedAddressBook</a:t>
+              <a:t>StatisticsPanel</a:t>
             </a:r>
             <a:endParaRPr lang="en-SG" sz="1600" dirty="0">
               <a:solidFill>
@@ -4532,26 +4282,77 @@
           </a:p>
         </p:txBody>
       </p:sp>
-      <p:sp>
-        <p:nvSpPr>
-          <p:cNvPr id="86" name="Rectangle 85"/>
+      <p:cxnSp>
+        <p:nvCxnSpPr>
+          <p:cNvPr id="64" name="Straight Connector 63">
+            <a:extLst>
+              <a:ext uri="{FF2B5EF4-FFF2-40B4-BE49-F238E27FC236}">
+                <a16:creationId xmlns:a16="http://schemas.microsoft.com/office/drawing/2014/main" id="{4BE6EFB1-23F6-4163-85ED-38DFC3A4015A}"/>
+              </a:ext>
+            </a:extLst>
+          </p:cNvPr>
+          <p:cNvCxnSpPr>
+            <a:cxnSpLocks/>
+          </p:cNvCxnSpPr>
+          <p:nvPr/>
+        </p:nvCxnSpPr>
+        <p:spPr>
+          <a:xfrm>
+            <a:off x="3582726" y="4079730"/>
+            <a:ext cx="0" cy="3464070"/>
+          </a:xfrm>
+          <a:prstGeom prst="line">
+            <a:avLst/>
+          </a:prstGeom>
+          <a:ln w="19050">
+            <a:solidFill>
+              <a:srgbClr val="0070C0"/>
+            </a:solidFill>
+            <a:prstDash val="sysDash"/>
+          </a:ln>
+          <a:effectLst/>
+        </p:spPr>
+        <p:style>
+          <a:lnRef idx="1">
+            <a:schemeClr val="accent1"/>
+          </a:lnRef>
+          <a:fillRef idx="2">
+            <a:schemeClr val="accent1"/>
+          </a:fillRef>
+          <a:effectRef idx="1">
+            <a:schemeClr val="accent1"/>
+          </a:effectRef>
+          <a:fontRef idx="minor">
+            <a:schemeClr val="dk1"/>
+          </a:fontRef>
+        </p:style>
+      </p:cxnSp>
+      <p:sp>
+        <p:nvSpPr>
+          <p:cNvPr id="70" name="Rectangle 69">
+            <a:extLst>
+              <a:ext uri="{FF2B5EF4-FFF2-40B4-BE49-F238E27FC236}">
+                <a16:creationId xmlns:a16="http://schemas.microsoft.com/office/drawing/2014/main" id="{A2C82BA8-6273-471E-A3BA-802454217D6B}"/>
+              </a:ext>
+            </a:extLst>
+          </p:cNvPr>
           <p:cNvSpPr/>
           <p:nvPr/>
         </p:nvSpPr>
         <p:spPr>
           <a:xfrm>
-            <a:off x="8514207" y="3182840"/>
-            <a:ext cx="129933" cy="398562"/>
+            <a:off x="3516731" y="4253145"/>
+            <a:ext cx="136210" cy="2992443"/>
           </a:xfrm>
           <a:prstGeom prst="rect">
             <a:avLst/>
           </a:prstGeom>
           <a:solidFill>
-            <a:srgbClr val="7030A0"/>
+            <a:srgbClr val="0070C0"/>
           </a:solidFill>
           <a:ln>
             <a:solidFill>
-              <a:srgbClr val="7030A0"/>
+              <a:srgbClr val="0070C0"/>
             </a:solidFill>
           </a:ln>
           <a:effectLst/>
@@ -4579,16 +4380,557 @@
           </a:p>
         </p:txBody>
       </p:sp>
-      <p:sp>
-        <p:nvSpPr>
-          <p:cNvPr id="93" name="TextBox 92"/>
+      <p:grpSp>
+        <p:nvGrpSpPr>
+          <p:cNvPr id="38" name="Group 37">
+            <a:extLst>
+              <a:ext uri="{FF2B5EF4-FFF2-40B4-BE49-F238E27FC236}">
+                <a16:creationId xmlns:a16="http://schemas.microsoft.com/office/drawing/2014/main" id="{4E2851C9-5CF2-481F-B38A-9FA6146F52CD}"/>
+              </a:ext>
+            </a:extLst>
+          </p:cNvPr>
+          <p:cNvGrpSpPr/>
+          <p:nvPr/>
+        </p:nvGrpSpPr>
+        <p:grpSpPr>
+          <a:xfrm>
+            <a:off x="3048000" y="4455977"/>
+            <a:ext cx="2170208" cy="2859220"/>
+            <a:chOff x="2935189" y="4388300"/>
+            <a:chExt cx="2170208" cy="2859220"/>
+          </a:xfrm>
+        </p:grpSpPr>
+        <p:sp>
+          <p:nvSpPr>
+            <p:cNvPr id="68" name="Rectangle 67">
+              <a:extLst>
+                <a:ext uri="{FF2B5EF4-FFF2-40B4-BE49-F238E27FC236}">
+                  <a16:creationId xmlns:a16="http://schemas.microsoft.com/office/drawing/2014/main" id="{2E72BE05-3245-485E-B595-7B90F43C272D}"/>
+                </a:ext>
+              </a:extLst>
+            </p:cNvPr>
+            <p:cNvSpPr/>
+            <p:nvPr/>
+          </p:nvSpPr>
+          <p:spPr>
+            <a:xfrm>
+              <a:off x="2956742" y="4426489"/>
+              <a:ext cx="2148655" cy="2821031"/>
+            </a:xfrm>
+            <a:prstGeom prst="rect">
+              <a:avLst/>
+            </a:prstGeom>
+            <a:noFill/>
+            <a:ln w="19050">
+              <a:solidFill>
+                <a:srgbClr val="FF0000"/>
+              </a:solidFill>
+            </a:ln>
+          </p:spPr>
+          <p:style>
+            <a:lnRef idx="2">
+              <a:schemeClr val="accent1">
+                <a:shade val="50000"/>
+              </a:schemeClr>
+            </a:lnRef>
+            <a:fillRef idx="1">
+              <a:schemeClr val="accent1"/>
+            </a:fillRef>
+            <a:effectRef idx="0">
+              <a:schemeClr val="accent1"/>
+            </a:effectRef>
+            <a:fontRef idx="minor">
+              <a:schemeClr val="lt1"/>
+            </a:fontRef>
+          </p:style>
+          <p:txBody>
+            <a:bodyPr rot="0" spcFirstLastPara="0" vertOverflow="overflow" horzOverflow="overflow" vert="horz" wrap="square" lIns="91440" tIns="45720" rIns="91440" bIns="45720" numCol="1" spcCol="0" rtlCol="0" fromWordArt="0" anchor="ctr" anchorCtr="0" forceAA="0" compatLnSpc="1">
+              <a:prstTxWarp prst="textNoShape">
+                <a:avLst/>
+              </a:prstTxWarp>
+              <a:noAutofit/>
+            </a:bodyPr>
+            <a:lstStyle/>
+            <a:p>
+              <a:pPr algn="ctr"/>
+              <a:endParaRPr lang="en-US" dirty="0"/>
+            </a:p>
+          </p:txBody>
+        </p:sp>
+        <p:pic>
+          <p:nvPicPr>
+            <p:cNvPr id="71" name="Picture 70">
+              <a:extLst>
+                <a:ext uri="{FF2B5EF4-FFF2-40B4-BE49-F238E27FC236}">
+                  <a16:creationId xmlns:a16="http://schemas.microsoft.com/office/drawing/2014/main" id="{60E02E11-A3B5-4C79-93E6-AFBEF9D220FD}"/>
+                </a:ext>
+              </a:extLst>
+            </p:cNvPr>
+            <p:cNvPicPr>
+              <a:picLocks noChangeAspect="1"/>
+            </p:cNvPicPr>
+            <p:nvPr/>
+          </p:nvPicPr>
+          <p:blipFill>
+            <a:blip r:embed="rId2"/>
+            <a:stretch>
+              <a:fillRect/>
+            </a:stretch>
+          </p:blipFill>
+          <p:spPr>
+            <a:xfrm>
+              <a:off x="2935189" y="4388300"/>
+              <a:ext cx="365828" cy="322558"/>
+            </a:xfrm>
+            <a:prstGeom prst="rect">
+              <a:avLst/>
+            </a:prstGeom>
+          </p:spPr>
+        </p:pic>
+        <p:sp>
+          <p:nvSpPr>
+            <p:cNvPr id="72" name="TextBox 71">
+              <a:extLst>
+                <a:ext uri="{FF2B5EF4-FFF2-40B4-BE49-F238E27FC236}">
+                  <a16:creationId xmlns:a16="http://schemas.microsoft.com/office/drawing/2014/main" id="{75BACA58-D2CA-4A68-B6BA-A7D6FC396B15}"/>
+                </a:ext>
+              </a:extLst>
+            </p:cNvPr>
+            <p:cNvSpPr txBox="1"/>
+            <p:nvPr/>
+          </p:nvSpPr>
+          <p:spPr>
+            <a:xfrm>
+              <a:off x="3616044" y="4409896"/>
+              <a:ext cx="736099" cy="261610"/>
+            </a:xfrm>
+            <a:prstGeom prst="rect">
+              <a:avLst/>
+            </a:prstGeom>
+            <a:noFill/>
+          </p:spPr>
+          <p:txBody>
+            <a:bodyPr wrap="none" rtlCol="0">
+              <a:spAutoFit/>
+            </a:bodyPr>
+            <a:lstStyle/>
+            <a:p>
+              <a:r>
+                <a:rPr lang="en-US" sz="1100" dirty="0">
+                  <a:solidFill>
+                    <a:srgbClr val="FF0000"/>
+                  </a:solidFill>
+                </a:rPr>
+                <a:t>[No Data]</a:t>
+              </a:r>
+            </a:p>
+          </p:txBody>
+        </p:sp>
+      </p:grpSp>
+      <p:cxnSp>
+        <p:nvCxnSpPr>
+          <p:cNvPr id="77" name="Straight Arrow Connector 76">
+            <a:extLst>
+              <a:ext uri="{FF2B5EF4-FFF2-40B4-BE49-F238E27FC236}">
+                <a16:creationId xmlns:a16="http://schemas.microsoft.com/office/drawing/2014/main" id="{12E33843-487A-4CD6-A383-719FC02D3800}"/>
+              </a:ext>
+            </a:extLst>
+          </p:cNvPr>
+          <p:cNvCxnSpPr>
+            <a:cxnSpLocks/>
+          </p:cNvCxnSpPr>
+          <p:nvPr/>
+        </p:nvCxnSpPr>
+        <p:spPr>
+          <a:xfrm>
+            <a:off x="1694112" y="1981200"/>
+            <a:ext cx="1786035" cy="0"/>
+          </a:xfrm>
+          <a:prstGeom prst="straightConnector1">
+            <a:avLst/>
+          </a:prstGeom>
+          <a:ln w="19050">
+            <a:solidFill>
+              <a:srgbClr val="0070C0"/>
+            </a:solidFill>
+            <a:tailEnd type="arrow"/>
+          </a:ln>
+        </p:spPr>
+        <p:style>
+          <a:lnRef idx="1">
+            <a:schemeClr val="accent1"/>
+          </a:lnRef>
+          <a:fillRef idx="0">
+            <a:schemeClr val="accent1"/>
+          </a:fillRef>
+          <a:effectRef idx="0">
+            <a:schemeClr val="accent1"/>
+          </a:effectRef>
+          <a:fontRef idx="minor">
+            <a:schemeClr val="tx1"/>
+          </a:fontRef>
+        </p:style>
+      </p:cxnSp>
+      <p:cxnSp>
+        <p:nvCxnSpPr>
+          <p:cNvPr id="78" name="Straight Arrow Connector 77">
+            <a:extLst>
+              <a:ext uri="{FF2B5EF4-FFF2-40B4-BE49-F238E27FC236}">
+                <a16:creationId xmlns:a16="http://schemas.microsoft.com/office/drawing/2014/main" id="{55E12A50-38F1-4768-A6FF-C347A36393FB}"/>
+              </a:ext>
+            </a:extLst>
+          </p:cNvPr>
+          <p:cNvCxnSpPr>
+            <a:cxnSpLocks/>
+          </p:cNvCxnSpPr>
+          <p:nvPr/>
+        </p:nvCxnSpPr>
+        <p:spPr>
+          <a:xfrm>
+            <a:off x="1676400" y="2217482"/>
+            <a:ext cx="1803747" cy="0"/>
+          </a:xfrm>
+          <a:prstGeom prst="straightConnector1">
+            <a:avLst/>
+          </a:prstGeom>
+          <a:ln w="19050">
+            <a:solidFill>
+              <a:srgbClr val="7030A0"/>
+            </a:solidFill>
+            <a:prstDash val="sysDash"/>
+            <a:headEnd type="arrow" w="med" len="med"/>
+            <a:tailEnd type="none" w="med" len="med"/>
+          </a:ln>
+        </p:spPr>
+        <p:style>
+          <a:lnRef idx="1">
+            <a:schemeClr val="accent1"/>
+          </a:lnRef>
+          <a:fillRef idx="0">
+            <a:schemeClr val="accent1"/>
+          </a:fillRef>
+          <a:effectRef idx="0">
+            <a:schemeClr val="accent1"/>
+          </a:effectRef>
+          <a:fontRef idx="minor">
+            <a:schemeClr val="tx1"/>
+          </a:fontRef>
+        </p:style>
+      </p:cxnSp>
+      <p:cxnSp>
+        <p:nvCxnSpPr>
+          <p:cNvPr id="85" name="Straight Arrow Connector 84">
+            <a:extLst>
+              <a:ext uri="{FF2B5EF4-FFF2-40B4-BE49-F238E27FC236}">
+                <a16:creationId xmlns:a16="http://schemas.microsoft.com/office/drawing/2014/main" id="{1136B3FC-5867-4C83-B60E-905D763176A2}"/>
+              </a:ext>
+            </a:extLst>
+          </p:cNvPr>
+          <p:cNvCxnSpPr>
+            <a:cxnSpLocks/>
+          </p:cNvCxnSpPr>
+          <p:nvPr/>
+        </p:nvCxnSpPr>
+        <p:spPr>
+          <a:xfrm>
+            <a:off x="1694112" y="2590800"/>
+            <a:ext cx="1786035" cy="0"/>
+          </a:xfrm>
+          <a:prstGeom prst="straightConnector1">
+            <a:avLst/>
+          </a:prstGeom>
+          <a:ln w="19050">
+            <a:solidFill>
+              <a:srgbClr val="0070C0"/>
+            </a:solidFill>
+            <a:tailEnd type="arrow"/>
+          </a:ln>
+        </p:spPr>
+        <p:style>
+          <a:lnRef idx="1">
+            <a:schemeClr val="accent1"/>
+          </a:lnRef>
+          <a:fillRef idx="0">
+            <a:schemeClr val="accent1"/>
+          </a:fillRef>
+          <a:effectRef idx="0">
+            <a:schemeClr val="accent1"/>
+          </a:effectRef>
+          <a:fontRef idx="minor">
+            <a:schemeClr val="tx1"/>
+          </a:fontRef>
+        </p:style>
+      </p:cxnSp>
+      <p:cxnSp>
+        <p:nvCxnSpPr>
+          <p:cNvPr id="87" name="Straight Arrow Connector 86">
+            <a:extLst>
+              <a:ext uri="{FF2B5EF4-FFF2-40B4-BE49-F238E27FC236}">
+                <a16:creationId xmlns:a16="http://schemas.microsoft.com/office/drawing/2014/main" id="{6A9774D2-C108-457F-9FE3-47891ECACB56}"/>
+              </a:ext>
+            </a:extLst>
+          </p:cNvPr>
+          <p:cNvCxnSpPr>
+            <a:cxnSpLocks/>
+          </p:cNvCxnSpPr>
+          <p:nvPr/>
+        </p:nvCxnSpPr>
+        <p:spPr>
+          <a:xfrm>
+            <a:off x="1676400" y="2827082"/>
+            <a:ext cx="1803747" cy="0"/>
+          </a:xfrm>
+          <a:prstGeom prst="straightConnector1">
+            <a:avLst/>
+          </a:prstGeom>
+          <a:ln w="19050">
+            <a:solidFill>
+              <a:srgbClr val="7030A0"/>
+            </a:solidFill>
+            <a:prstDash val="sysDash"/>
+            <a:headEnd type="arrow" w="med" len="med"/>
+            <a:tailEnd type="none" w="med" len="med"/>
+          </a:ln>
+        </p:spPr>
+        <p:style>
+          <a:lnRef idx="1">
+            <a:schemeClr val="accent1"/>
+          </a:lnRef>
+          <a:fillRef idx="0">
+            <a:schemeClr val="accent1"/>
+          </a:fillRef>
+          <a:effectRef idx="0">
+            <a:schemeClr val="accent1"/>
+          </a:effectRef>
+          <a:fontRef idx="minor">
+            <a:schemeClr val="tx1"/>
+          </a:fontRef>
+        </p:style>
+      </p:cxnSp>
+      <p:cxnSp>
+        <p:nvCxnSpPr>
+          <p:cNvPr id="90" name="Straight Arrow Connector 89">
+            <a:extLst>
+              <a:ext uri="{FF2B5EF4-FFF2-40B4-BE49-F238E27FC236}">
+                <a16:creationId xmlns:a16="http://schemas.microsoft.com/office/drawing/2014/main" id="{C0D80509-C53C-4003-A096-B21065A3822A}"/>
+              </a:ext>
+            </a:extLst>
+          </p:cNvPr>
+          <p:cNvCxnSpPr>
+            <a:cxnSpLocks/>
+          </p:cNvCxnSpPr>
+          <p:nvPr/>
+        </p:nvCxnSpPr>
+        <p:spPr>
+          <a:xfrm>
+            <a:off x="1719165" y="3200400"/>
+            <a:ext cx="1786035" cy="0"/>
+          </a:xfrm>
+          <a:prstGeom prst="straightConnector1">
+            <a:avLst/>
+          </a:prstGeom>
+          <a:ln w="19050">
+            <a:solidFill>
+              <a:srgbClr val="0070C0"/>
+            </a:solidFill>
+            <a:tailEnd type="arrow"/>
+          </a:ln>
+        </p:spPr>
+        <p:style>
+          <a:lnRef idx="1">
+            <a:schemeClr val="accent1"/>
+          </a:lnRef>
+          <a:fillRef idx="0">
+            <a:schemeClr val="accent1"/>
+          </a:fillRef>
+          <a:effectRef idx="0">
+            <a:schemeClr val="accent1"/>
+          </a:effectRef>
+          <a:fontRef idx="minor">
+            <a:schemeClr val="tx1"/>
+          </a:fontRef>
+        </p:style>
+      </p:cxnSp>
+      <p:cxnSp>
+        <p:nvCxnSpPr>
+          <p:cNvPr id="91" name="Straight Arrow Connector 90">
+            <a:extLst>
+              <a:ext uri="{FF2B5EF4-FFF2-40B4-BE49-F238E27FC236}">
+                <a16:creationId xmlns:a16="http://schemas.microsoft.com/office/drawing/2014/main" id="{952154C2-A2E2-4C50-8FD2-05F696CE6E71}"/>
+              </a:ext>
+            </a:extLst>
+          </p:cNvPr>
+          <p:cNvCxnSpPr>
+            <a:cxnSpLocks/>
+          </p:cNvCxnSpPr>
+          <p:nvPr/>
+        </p:nvCxnSpPr>
+        <p:spPr>
+          <a:xfrm>
+            <a:off x="1701453" y="3436682"/>
+            <a:ext cx="1803747" cy="0"/>
+          </a:xfrm>
+          <a:prstGeom prst="straightConnector1">
+            <a:avLst/>
+          </a:prstGeom>
+          <a:ln w="19050">
+            <a:solidFill>
+              <a:srgbClr val="7030A0"/>
+            </a:solidFill>
+            <a:prstDash val="sysDash"/>
+            <a:headEnd type="arrow" w="med" len="med"/>
+            <a:tailEnd type="none" w="med" len="med"/>
+          </a:ln>
+        </p:spPr>
+        <p:style>
+          <a:lnRef idx="1">
+            <a:schemeClr val="accent1"/>
+          </a:lnRef>
+          <a:fillRef idx="0">
+            <a:schemeClr val="accent1"/>
+          </a:fillRef>
+          <a:effectRef idx="0">
+            <a:schemeClr val="accent1"/>
+          </a:effectRef>
+          <a:fontRef idx="minor">
+            <a:schemeClr val="tx1"/>
+          </a:fontRef>
+        </p:style>
+      </p:cxnSp>
+      <p:sp>
+        <p:nvSpPr>
+          <p:cNvPr id="92" name="Rectangle 62">
+            <a:extLst>
+              <a:ext uri="{FF2B5EF4-FFF2-40B4-BE49-F238E27FC236}">
+                <a16:creationId xmlns:a16="http://schemas.microsoft.com/office/drawing/2014/main" id="{FE1444C3-EF65-4F64-9288-B290531515EC}"/>
+              </a:ext>
+            </a:extLst>
+          </p:cNvPr>
+          <p:cNvSpPr/>
+          <p:nvPr/>
+        </p:nvSpPr>
+        <p:spPr>
+          <a:xfrm>
+            <a:off x="4800600" y="3732970"/>
+            <a:ext cx="1455629" cy="346760"/>
+          </a:xfrm>
+          <a:prstGeom prst="rect">
+            <a:avLst/>
+          </a:prstGeom>
+          <a:solidFill>
+            <a:srgbClr val="0070C0"/>
+          </a:solidFill>
+          <a:ln w="19050">
+            <a:solidFill>
+              <a:srgbClr val="0070C0"/>
+            </a:solidFill>
+          </a:ln>
+          <a:effectLst/>
+        </p:spPr>
+        <p:style>
+          <a:lnRef idx="1">
+            <a:schemeClr val="accent2"/>
+          </a:lnRef>
+          <a:fillRef idx="2">
+            <a:schemeClr val="accent2"/>
+          </a:fillRef>
+          <a:effectRef idx="1">
+            <a:schemeClr val="accent2"/>
+          </a:effectRef>
+          <a:fontRef idx="minor">
+            <a:schemeClr val="dk1"/>
+          </a:fontRef>
+        </p:style>
+        <p:txBody>
+          <a:bodyPr rtlCol="0" anchor="ctr"/>
+          <a:lstStyle/>
+          <a:p>
+            <a:pPr algn="ctr"/>
+            <a:r>
+              <a:rPr lang="en-US" sz="1600" dirty="0">
+                <a:solidFill>
+                  <a:schemeClr val="bg1"/>
+                </a:solidFill>
+              </a:rPr>
+              <a:t>:</a:t>
+            </a:r>
+            <a:r>
+              <a:rPr lang="en-US" sz="1600" dirty="0" err="1">
+                <a:solidFill>
+                  <a:schemeClr val="bg1"/>
+                </a:solidFill>
+              </a:rPr>
+              <a:t>StackPane</a:t>
+            </a:r>
+            <a:endParaRPr lang="en-SG" sz="1600" dirty="0">
+              <a:solidFill>
+                <a:schemeClr val="bg1"/>
+              </a:solidFill>
+            </a:endParaRPr>
+          </a:p>
+        </p:txBody>
+      </p:sp>
+      <p:cxnSp>
+        <p:nvCxnSpPr>
+          <p:cNvPr id="94" name="Straight Connector 93">
+            <a:extLst>
+              <a:ext uri="{FF2B5EF4-FFF2-40B4-BE49-F238E27FC236}">
+                <a16:creationId xmlns:a16="http://schemas.microsoft.com/office/drawing/2014/main" id="{0A7542CE-91B3-469E-898F-4EBDCF3CC60B}"/>
+              </a:ext>
+            </a:extLst>
+          </p:cNvPr>
+          <p:cNvCxnSpPr>
+            <a:cxnSpLocks/>
+          </p:cNvCxnSpPr>
+          <p:nvPr/>
+        </p:nvCxnSpPr>
+        <p:spPr>
+          <a:xfrm>
+            <a:off x="5555407" y="4079730"/>
+            <a:ext cx="0" cy="3513413"/>
+          </a:xfrm>
+          <a:prstGeom prst="line">
+            <a:avLst/>
+          </a:prstGeom>
+          <a:ln w="19050">
+            <a:solidFill>
+              <a:srgbClr val="0070C0"/>
+            </a:solidFill>
+            <a:prstDash val="sysDash"/>
+          </a:ln>
+          <a:effectLst/>
+        </p:spPr>
+        <p:style>
+          <a:lnRef idx="1">
+            <a:schemeClr val="accent1"/>
+          </a:lnRef>
+          <a:fillRef idx="2">
+            <a:schemeClr val="accent1"/>
+          </a:fillRef>
+          <a:effectRef idx="1">
+            <a:schemeClr val="accent1"/>
+          </a:effectRef>
+          <a:fontRef idx="minor">
+            <a:schemeClr val="dk1"/>
+          </a:fontRef>
+        </p:style>
+      </p:cxnSp>
+      <p:sp>
+        <p:nvSpPr>
+          <p:cNvPr id="95" name="TextBox 94">
+            <a:extLst>
+              <a:ext uri="{FF2B5EF4-FFF2-40B4-BE49-F238E27FC236}">
+                <a16:creationId xmlns:a16="http://schemas.microsoft.com/office/drawing/2014/main" id="{22D4B113-1137-4AD3-B7F3-6E8A4C3494DB}"/>
+              </a:ext>
+            </a:extLst>
+          </p:cNvPr>
           <p:cNvSpPr txBox="1"/>
           <p:nvPr/>
         </p:nvSpPr>
         <p:spPr>
           <a:xfrm>
-            <a:off x="2724792" y="1905793"/>
-            <a:ext cx="220343" cy="215444"/>
+            <a:off x="3586849" y="4114800"/>
+            <a:ext cx="1899551" cy="215444"/>
           </a:xfrm>
           <a:prstGeom prst="rect">
             <a:avLst/>
@@ -4612,131 +4954,88 @@
             </a:lvl1pPr>
           </a:lstStyle>
           <a:p>
+            <a:pPr algn="ctr"/>
+            <a:r>
+              <a:rPr lang="en-US" dirty="0" err="1"/>
+              <a:t>getChildren</a:t>
+            </a:r>
             <a:r>
               <a:rPr lang="en-US" dirty="0"/>
-              <a:t>u</a:t>
-            </a:r>
-          </a:p>
-        </p:txBody>
-      </p:sp>
-      <p:sp>
-        <p:nvSpPr>
-          <p:cNvPr id="40" name="Rectangle 62"/>
-          <p:cNvSpPr/>
-          <p:nvPr/>
-        </p:nvSpPr>
-        <p:spPr>
-          <a:xfrm>
-            <a:off x="6549765" y="2362200"/>
-            <a:ext cx="841636" cy="300180"/>
-          </a:xfrm>
-          <a:prstGeom prst="rect">
-            <a:avLst/>
-          </a:prstGeom>
-          <a:solidFill>
-            <a:srgbClr val="7030A0"/>
-          </a:solidFill>
-          <a:ln w="19050">
-            <a:solidFill>
-              <a:srgbClr val="7030A0"/>
-            </a:solidFill>
-          </a:ln>
-          <a:effectLst/>
-        </p:spPr>
-        <p:style>
-          <a:lnRef idx="1">
-            <a:schemeClr val="accent2"/>
-          </a:lnRef>
-          <a:fillRef idx="2">
-            <a:schemeClr val="accent2"/>
-          </a:fillRef>
-          <a:effectRef idx="1">
-            <a:schemeClr val="accent2"/>
-          </a:effectRef>
-          <a:fontRef idx="minor">
-            <a:schemeClr val="dk1"/>
-          </a:fontRef>
-        </p:style>
-        <p:txBody>
-          <a:bodyPr rtlCol="0" anchor="ctr"/>
-          <a:lstStyle/>
-          <a:p>
-            <a:pPr algn="ctr"/>
-            <a:r>
-              <a:rPr lang="en-US" sz="1600" dirty="0">
-                <a:solidFill>
-                  <a:schemeClr val="bg1"/>
-                </a:solidFill>
-              </a:rPr>
-              <a:t>: Model</a:t>
-            </a:r>
-            <a:endParaRPr lang="en-SG" sz="1600" dirty="0">
-              <a:solidFill>
-                <a:schemeClr val="bg1"/>
-              </a:solidFill>
-            </a:endParaRPr>
+              <a:t>().clear()</a:t>
+            </a:r>
           </a:p>
         </p:txBody>
       </p:sp>
       <p:cxnSp>
         <p:nvCxnSpPr>
-          <p:cNvPr id="46" name="Straight Connector 45"/>
+          <p:cNvPr id="96" name="Straight Arrow Connector 95">
+            <a:extLst>
+              <a:ext uri="{FF2B5EF4-FFF2-40B4-BE49-F238E27FC236}">
+                <a16:creationId xmlns:a16="http://schemas.microsoft.com/office/drawing/2014/main" id="{8B0BDD26-FEF6-4646-A9E3-1985011E70F7}"/>
+              </a:ext>
+            </a:extLst>
+          </p:cNvPr>
           <p:cNvCxnSpPr>
             <a:cxnSpLocks/>
           </p:cNvCxnSpPr>
           <p:nvPr/>
         </p:nvCxnSpPr>
         <p:spPr>
-          <a:xfrm flipH="1">
-            <a:off x="6986491" y="2653306"/>
-            <a:ext cx="3959" cy="1735710"/>
-          </a:xfrm>
-          <a:prstGeom prst="line">
+          <a:xfrm>
+            <a:off x="3652941" y="4372568"/>
+            <a:ext cx="1842143" cy="0"/>
+          </a:xfrm>
+          <a:prstGeom prst="straightConnector1">
             <a:avLst/>
           </a:prstGeom>
           <a:ln w="19050">
             <a:solidFill>
-              <a:srgbClr val="7030A0"/>
+              <a:srgbClr val="0070C0"/>
             </a:solidFill>
-            <a:prstDash val="sysDash"/>
+            <a:tailEnd type="arrow"/>
           </a:ln>
-          <a:effectLst/>
         </p:spPr>
         <p:style>
           <a:lnRef idx="1">
             <a:schemeClr val="accent1"/>
           </a:lnRef>
-          <a:fillRef idx="2">
+          <a:fillRef idx="0">
             <a:schemeClr val="accent1"/>
           </a:fillRef>
-          <a:effectRef idx="1">
+          <a:effectRef idx="0">
             <a:schemeClr val="accent1"/>
           </a:effectRef>
           <a:fontRef idx="minor">
-            <a:schemeClr val="dk1"/>
+            <a:schemeClr val="tx1"/>
           </a:fontRef>
         </p:style>
       </p:cxnSp>
       <p:sp>
         <p:nvSpPr>
-          <p:cNvPr id="49" name="Rectangle 48"/>
+          <p:cNvPr id="98" name="Rectangle 97">
+            <a:extLst>
+              <a:ext uri="{FF2B5EF4-FFF2-40B4-BE49-F238E27FC236}">
+                <a16:creationId xmlns:a16="http://schemas.microsoft.com/office/drawing/2014/main" id="{54CB8DCB-7F7C-4CB5-A117-5B0AED9F966B}"/>
+              </a:ext>
+            </a:extLst>
+          </p:cNvPr>
           <p:cNvSpPr/>
           <p:nvPr/>
         </p:nvSpPr>
         <p:spPr>
           <a:xfrm>
-            <a:off x="6887527" y="2958106"/>
-            <a:ext cx="168896" cy="775693"/>
+            <a:off x="5487301" y="4354380"/>
+            <a:ext cx="136196" cy="141420"/>
           </a:xfrm>
           <a:prstGeom prst="rect">
             <a:avLst/>
           </a:prstGeom>
           <a:solidFill>
-            <a:srgbClr val="7030A0"/>
+            <a:srgbClr val="0070C0"/>
           </a:solidFill>
           <a:ln>
             <a:solidFill>
-              <a:srgbClr val="7030A0"/>
+              <a:srgbClr val="0070C0"/>
             </a:solidFill>
           </a:ln>
           <a:effectLst/>
@@ -4764,291 +5063,12 @@
           </a:p>
         </p:txBody>
       </p:sp>
-      <p:cxnSp>
-        <p:nvCxnSpPr>
-          <p:cNvPr id="50" name="Straight Arrow Connector 49"/>
-          <p:cNvCxnSpPr>
-            <a:cxnSpLocks/>
-          </p:cNvCxnSpPr>
-          <p:nvPr/>
-        </p:nvCxnSpPr>
-        <p:spPr>
-          <a:xfrm>
-            <a:off x="5685755" y="2975344"/>
-            <a:ext cx="1210345" cy="0"/>
-          </a:xfrm>
-          <a:prstGeom prst="straightConnector1">
-            <a:avLst/>
-          </a:prstGeom>
-          <a:ln w="19050">
-            <a:solidFill>
-              <a:srgbClr val="0070C0"/>
-            </a:solidFill>
-            <a:tailEnd type="arrow"/>
-          </a:ln>
-        </p:spPr>
-        <p:style>
-          <a:lnRef idx="1">
-            <a:schemeClr val="accent1"/>
-          </a:lnRef>
-          <a:fillRef idx="0">
-            <a:schemeClr val="accent1"/>
-          </a:fillRef>
-          <a:effectRef idx="0">
-            <a:schemeClr val="accent1"/>
-          </a:effectRef>
-          <a:fontRef idx="minor">
-            <a:schemeClr val="tx1"/>
-          </a:fontRef>
-        </p:style>
-      </p:cxnSp>
-      <p:sp>
-        <p:nvSpPr>
-          <p:cNvPr id="4" name="TextBox 3"/>
-          <p:cNvSpPr txBox="1"/>
-          <p:nvPr/>
-        </p:nvSpPr>
-        <p:spPr>
-          <a:xfrm>
-            <a:off x="5472880" y="4258211"/>
-            <a:ext cx="258404" cy="261610"/>
-          </a:xfrm>
-          <a:prstGeom prst="rect">
-            <a:avLst/>
-          </a:prstGeom>
-          <a:noFill/>
-        </p:spPr>
-        <p:txBody>
-          <a:bodyPr wrap="none" rtlCol="0">
-            <a:spAutoFit/>
-          </a:bodyPr>
-          <a:lstStyle/>
-          <a:p>
-            <a:r>
-              <a:rPr lang="en-SG" sz="1100" dirty="0">
-                <a:solidFill>
-                  <a:srgbClr val="002060"/>
-                </a:solidFill>
-              </a:rPr>
-              <a:t>X</a:t>
-            </a:r>
-          </a:p>
-        </p:txBody>
-      </p:sp>
-      <p:sp>
-        <p:nvSpPr>
-          <p:cNvPr id="19" name="Rectangle 62"/>
-          <p:cNvSpPr/>
-          <p:nvPr/>
-        </p:nvSpPr>
-        <p:spPr>
-          <a:xfrm>
-            <a:off x="5035976" y="1260268"/>
-            <a:ext cx="1093635" cy="461538"/>
-          </a:xfrm>
-          <a:prstGeom prst="rect">
-            <a:avLst/>
-          </a:prstGeom>
-          <a:solidFill>
-            <a:srgbClr val="0070C0"/>
-          </a:solidFill>
-          <a:ln w="19050">
-            <a:solidFill>
-              <a:srgbClr val="0070C0"/>
-            </a:solidFill>
-          </a:ln>
-          <a:effectLst/>
-        </p:spPr>
-        <p:style>
-          <a:lnRef idx="1">
-            <a:schemeClr val="accent2"/>
-          </a:lnRef>
-          <a:fillRef idx="2">
-            <a:schemeClr val="accent2"/>
-          </a:fillRef>
-          <a:effectRef idx="1">
-            <a:schemeClr val="accent2"/>
-          </a:effectRef>
-          <a:fontRef idx="minor">
-            <a:schemeClr val="dk1"/>
-          </a:fontRef>
-        </p:style>
-        <p:txBody>
-          <a:bodyPr rtlCol="0" anchor="ctr"/>
-          <a:lstStyle/>
-          <a:p>
-            <a:pPr algn="ctr"/>
-            <a:r>
-              <a:rPr lang="en-US" sz="1600" dirty="0">
-                <a:solidFill>
-                  <a:schemeClr val="bg1"/>
-                </a:solidFill>
-              </a:rPr>
-              <a:t>u:Undo</a:t>
-            </a:r>
-            <a:br>
-              <a:rPr lang="en-US" sz="1600" dirty="0">
-                <a:solidFill>
-                  <a:schemeClr val="bg1"/>
-                </a:solidFill>
-              </a:rPr>
-            </a:br>
-            <a:r>
-              <a:rPr lang="en-US" sz="1600" dirty="0">
-                <a:solidFill>
-                  <a:schemeClr val="bg1"/>
-                </a:solidFill>
-              </a:rPr>
-              <a:t>Command</a:t>
-            </a:r>
-            <a:endParaRPr lang="en-SG" sz="1600" dirty="0">
-              <a:solidFill>
-                <a:schemeClr val="bg1"/>
-              </a:solidFill>
-            </a:endParaRPr>
-          </a:p>
-        </p:txBody>
-      </p:sp>
-      <p:cxnSp>
-        <p:nvCxnSpPr>
-          <p:cNvPr id="66" name="Straight Arrow Connector 65">
+      <p:sp>
+        <p:nvSpPr>
+          <p:cNvPr id="102" name="TextBox 101">
             <a:extLst>
               <a:ext uri="{FF2B5EF4-FFF2-40B4-BE49-F238E27FC236}">
-                <a16:creationId xmlns:a16="http://schemas.microsoft.com/office/drawing/2014/main" id="{39916E2E-195A-4DC8-B025-B05FA87E6796}"/>
-              </a:ext>
-            </a:extLst>
-          </p:cNvPr>
-          <p:cNvCxnSpPr>
-            <a:cxnSpLocks/>
-          </p:cNvCxnSpPr>
-          <p:nvPr/>
-        </p:nvCxnSpPr>
-        <p:spPr>
-          <a:xfrm>
-            <a:off x="1691351" y="2731314"/>
-            <a:ext cx="3832164" cy="1"/>
-          </a:xfrm>
-          <a:prstGeom prst="straightConnector1">
-            <a:avLst/>
-          </a:prstGeom>
-          <a:ln w="19050">
-            <a:solidFill>
-              <a:srgbClr val="0070C0"/>
-            </a:solidFill>
-            <a:tailEnd type="arrow"/>
-          </a:ln>
-        </p:spPr>
-        <p:style>
-          <a:lnRef idx="1">
-            <a:schemeClr val="accent1"/>
-          </a:lnRef>
-          <a:fillRef idx="0">
-            <a:schemeClr val="accent1"/>
-          </a:fillRef>
-          <a:effectRef idx="0">
-            <a:schemeClr val="accent1"/>
-          </a:effectRef>
-          <a:fontRef idx="minor">
-            <a:schemeClr val="tx1"/>
-          </a:fontRef>
-        </p:style>
-      </p:cxnSp>
-      <p:cxnSp>
-        <p:nvCxnSpPr>
-          <p:cNvPr id="67" name="Straight Arrow Connector 66">
-            <a:extLst>
-              <a:ext uri="{FF2B5EF4-FFF2-40B4-BE49-F238E27FC236}">
-                <a16:creationId xmlns:a16="http://schemas.microsoft.com/office/drawing/2014/main" id="{D881596E-177C-4FDC-8E60-CAB90B3D5FAB}"/>
-              </a:ext>
-            </a:extLst>
-          </p:cNvPr>
-          <p:cNvCxnSpPr>
-            <a:cxnSpLocks/>
-          </p:cNvCxnSpPr>
-          <p:nvPr/>
-        </p:nvCxnSpPr>
-        <p:spPr>
-          <a:xfrm>
-            <a:off x="1708245" y="1363918"/>
-            <a:ext cx="2256705" cy="1"/>
-          </a:xfrm>
-          <a:prstGeom prst="straightConnector1">
-            <a:avLst/>
-          </a:prstGeom>
-          <a:ln w="19050">
-            <a:solidFill>
-              <a:srgbClr val="0070C0"/>
-            </a:solidFill>
-            <a:tailEnd type="arrow"/>
-          </a:ln>
-        </p:spPr>
-        <p:style>
-          <a:lnRef idx="1">
-            <a:schemeClr val="accent1"/>
-          </a:lnRef>
-          <a:fillRef idx="0">
-            <a:schemeClr val="accent1"/>
-          </a:fillRef>
-          <a:effectRef idx="0">
-            <a:schemeClr val="accent1"/>
-          </a:effectRef>
-          <a:fontRef idx="minor">
-            <a:schemeClr val="tx1"/>
-          </a:fontRef>
-        </p:style>
-      </p:cxnSp>
-      <p:cxnSp>
-        <p:nvCxnSpPr>
-          <p:cNvPr id="69" name="Straight Arrow Connector 68">
-            <a:extLst>
-              <a:ext uri="{FF2B5EF4-FFF2-40B4-BE49-F238E27FC236}">
-                <a16:creationId xmlns:a16="http://schemas.microsoft.com/office/drawing/2014/main" id="{7C9F21BC-13A9-471F-825A-2621FD36355F}"/>
-              </a:ext>
-            </a:extLst>
-          </p:cNvPr>
-          <p:cNvCxnSpPr>
-            <a:cxnSpLocks/>
-          </p:cNvCxnSpPr>
-          <p:nvPr/>
-        </p:nvCxnSpPr>
-        <p:spPr>
-          <a:xfrm>
-            <a:off x="1691998" y="4036462"/>
-            <a:ext cx="3831517" cy="0"/>
-          </a:xfrm>
-          <a:prstGeom prst="straightConnector1">
-            <a:avLst/>
-          </a:prstGeom>
-          <a:ln w="19050">
-            <a:solidFill>
-              <a:srgbClr val="0070C0"/>
-            </a:solidFill>
-            <a:prstDash val="sysDash"/>
-            <a:headEnd type="arrow" w="med" len="med"/>
-            <a:tailEnd type="none" w="med" len="med"/>
-          </a:ln>
-        </p:spPr>
-        <p:style>
-          <a:lnRef idx="1">
-            <a:schemeClr val="accent1"/>
-          </a:lnRef>
-          <a:fillRef idx="0">
-            <a:schemeClr val="accent1"/>
-          </a:fillRef>
-          <a:effectRef idx="0">
-            <a:schemeClr val="accent1"/>
-          </a:effectRef>
-          <a:fontRef idx="minor">
-            <a:schemeClr val="tx1"/>
-          </a:fontRef>
-        </p:style>
-      </p:cxnSp>
-      <p:sp>
-        <p:nvSpPr>
-          <p:cNvPr id="88" name="TextBox 87">
-            <a:extLst>
-              <a:ext uri="{FF2B5EF4-FFF2-40B4-BE49-F238E27FC236}">
-                <a16:creationId xmlns:a16="http://schemas.microsoft.com/office/drawing/2014/main" id="{B85C6184-7378-4E89-A338-72B1E5056F4F}"/>
+                <a16:creationId xmlns:a16="http://schemas.microsoft.com/office/drawing/2014/main" id="{7A1B81F9-6A4E-416B-AD87-5A13FA66CEDF}"/>
               </a:ext>
             </a:extLst>
           </p:cNvPr>
@@ -5057,8 +5077,8 @@
         </p:nvSpPr>
         <p:spPr>
           <a:xfrm>
-            <a:off x="8769530" y="3267337"/>
-            <a:ext cx="2120786" cy="184666"/>
+            <a:off x="3505200" y="4771432"/>
+            <a:ext cx="1899551" cy="215444"/>
           </a:xfrm>
           <a:prstGeom prst="rect">
             <a:avLst/>
@@ -5082,48 +5102,24 @@
             </a:lvl1pPr>
           </a:lstStyle>
           <a:p>
-            <a:r>
-              <a:rPr lang="en-US" sz="1200" dirty="0" err="1">
-                <a:solidFill>
-                  <a:srgbClr val="7030A0"/>
-                </a:solidFill>
-              </a:rPr>
-              <a:t>resetData</a:t>
-            </a:r>
-            <a:r>
-              <a:rPr lang="en-US" sz="1200" dirty="0">
-                <a:solidFill>
-                  <a:srgbClr val="7030A0"/>
-                </a:solidFill>
-              </a:rPr>
-              <a:t>(</a:t>
-            </a:r>
-            <a:r>
-              <a:rPr lang="en-US" sz="1200" dirty="0" err="1">
-                <a:solidFill>
-                  <a:srgbClr val="7030A0"/>
-                </a:solidFill>
-              </a:rPr>
-              <a:t>ReadOnlyAddressBook</a:t>
-            </a:r>
-            <a:r>
-              <a:rPr lang="en-US" sz="1200" dirty="0">
-                <a:solidFill>
-                  <a:srgbClr val="7030A0"/>
-                </a:solidFill>
-              </a:rPr>
-              <a:t>)</a:t>
-            </a:r>
-            <a:endParaRPr lang="en-US" sz="1200" dirty="0"/>
+            <a:pPr algn="ctr"/>
+            <a:r>
+              <a:rPr lang="en-US" dirty="0" err="1"/>
+              <a:t>getChildren</a:t>
+            </a:r>
+            <a:r>
+              <a:rPr lang="en-US" dirty="0"/>
+              <a:t>().add()</a:t>
+            </a:r>
           </a:p>
         </p:txBody>
       </p:sp>
       <p:cxnSp>
         <p:nvCxnSpPr>
-          <p:cNvPr id="89" name="Straight Connector 88">
+          <p:cNvPr id="103" name="Straight Arrow Connector 102">
             <a:extLst>
               <a:ext uri="{FF2B5EF4-FFF2-40B4-BE49-F238E27FC236}">
-                <a16:creationId xmlns:a16="http://schemas.microsoft.com/office/drawing/2014/main" id="{E4E1C8CA-49DF-45D8-80A5-D5C8282EE927}"/>
+                <a16:creationId xmlns:a16="http://schemas.microsoft.com/office/drawing/2014/main" id="{FA21AE3F-6833-430B-B63A-955C07744C16}"/>
               </a:ext>
             </a:extLst>
           </p:cNvPr>
@@ -5134,53 +5130,108 @@
         </p:nvCxnSpPr>
         <p:spPr>
           <a:xfrm>
-            <a:off x="8588043" y="2871355"/>
-            <a:ext cx="17996" cy="1467648"/>
-          </a:xfrm>
-          <a:prstGeom prst="line">
+            <a:off x="3647492" y="5029200"/>
+            <a:ext cx="1842143" cy="0"/>
+          </a:xfrm>
+          <a:prstGeom prst="straightConnector1">
             <a:avLst/>
           </a:prstGeom>
           <a:ln w="19050">
             <a:solidFill>
-              <a:srgbClr val="7030A0"/>
+              <a:srgbClr val="0070C0"/>
             </a:solidFill>
-            <a:prstDash val="sysDash"/>
+            <a:tailEnd type="arrow"/>
+          </a:ln>
+        </p:spPr>
+        <p:style>
+          <a:lnRef idx="1">
+            <a:schemeClr val="accent1"/>
+          </a:lnRef>
+          <a:fillRef idx="0">
+            <a:schemeClr val="accent1"/>
+          </a:fillRef>
+          <a:effectRef idx="0">
+            <a:schemeClr val="accent1"/>
+          </a:effectRef>
+          <a:fontRef idx="minor">
+            <a:schemeClr val="tx1"/>
+          </a:fontRef>
+        </p:style>
+      </p:cxnSp>
+      <p:sp>
+        <p:nvSpPr>
+          <p:cNvPr id="104" name="Rectangle 103">
+            <a:extLst>
+              <a:ext uri="{FF2B5EF4-FFF2-40B4-BE49-F238E27FC236}">
+                <a16:creationId xmlns:a16="http://schemas.microsoft.com/office/drawing/2014/main" id="{4C1927B6-2575-4544-9811-08F8BBF0936F}"/>
+              </a:ext>
+            </a:extLst>
+          </p:cNvPr>
+          <p:cNvSpPr/>
+          <p:nvPr/>
+        </p:nvSpPr>
+        <p:spPr>
+          <a:xfrm>
+            <a:off x="5486400" y="5040180"/>
+            <a:ext cx="136196" cy="141420"/>
+          </a:xfrm>
+          <a:prstGeom prst="rect">
+            <a:avLst/>
+          </a:prstGeom>
+          <a:solidFill>
+            <a:srgbClr val="0070C0"/>
+          </a:solidFill>
+          <a:ln>
+            <a:solidFill>
+              <a:srgbClr val="0070C0"/>
+            </a:solidFill>
           </a:ln>
           <a:effectLst/>
         </p:spPr>
         <p:style>
           <a:lnRef idx="1">
-            <a:schemeClr val="accent1"/>
+            <a:schemeClr val="accent3"/>
           </a:lnRef>
           <a:fillRef idx="2">
-            <a:schemeClr val="accent1"/>
+            <a:schemeClr val="accent3"/>
           </a:fillRef>
           <a:effectRef idx="1">
-            <a:schemeClr val="accent1"/>
+            <a:schemeClr val="accent3"/>
           </a:effectRef>
           <a:fontRef idx="minor">
             <a:schemeClr val="dk1"/>
           </a:fontRef>
         </p:style>
-      </p:cxnSp>
-      <p:sp>
-        <p:nvSpPr>
-          <p:cNvPr id="41" name="TextBox 40"/>
+        <p:txBody>
+          <a:bodyPr rtlCol="0" anchor="ctr"/>
+          <a:lstStyle/>
+          <a:p>
+            <a:pPr algn="ctr"/>
+            <a:endParaRPr lang="en-SG" sz="1400"/>
+          </a:p>
+        </p:txBody>
+      </p:sp>
+      <p:sp>
+        <p:nvSpPr>
+          <p:cNvPr id="105" name="TextBox 104">
+            <a:extLst>
+              <a:ext uri="{FF2B5EF4-FFF2-40B4-BE49-F238E27FC236}">
+                <a16:creationId xmlns:a16="http://schemas.microsoft.com/office/drawing/2014/main" id="{E0F9CCA8-03DC-4AE3-935B-42D136B5A1DA}"/>
+              </a:ext>
+            </a:extLst>
+          </p:cNvPr>
           <p:cNvSpPr txBox="1"/>
           <p:nvPr/>
         </p:nvSpPr>
         <p:spPr>
           <a:xfrm>
-            <a:off x="7667691" y="2975344"/>
-            <a:ext cx="551687" cy="184666"/>
+            <a:off x="3505200" y="5867400"/>
+            <a:ext cx="1899551" cy="215444"/>
           </a:xfrm>
           <a:prstGeom prst="rect">
             <a:avLst/>
           </a:prstGeom>
           <a:noFill/>
-          <a:ln>
-            <a:noFill/>
-          </a:ln>
         </p:spPr>
         <p:txBody>
           <a:bodyPr wrap="square" lIns="0" tIns="0" rIns="0" bIns="0" rtlCol="0">
@@ -5199,49 +5250,45 @@
             </a:lvl1pPr>
           </a:lstStyle>
           <a:p>
-            <a:r>
-              <a:rPr lang="en-US" sz="1200" dirty="0">
-                <a:solidFill>
-                  <a:srgbClr val="7030A0"/>
-                </a:solidFill>
-              </a:rPr>
-              <a:t>undo</a:t>
-            </a:r>
-            <a:r>
-              <a:rPr lang="en-US" sz="1200" dirty="0">
-                <a:solidFill>
-                  <a:schemeClr val="accent4">
-                    <a:lumMod val="75000"/>
-                  </a:schemeClr>
-                </a:solidFill>
-              </a:rPr>
-              <a:t>()</a:t>
+            <a:pPr algn="ctr"/>
+            <a:r>
+              <a:rPr lang="en-US" dirty="0" err="1"/>
+              <a:t>getChildren</a:t>
+            </a:r>
+            <a:r>
+              <a:rPr lang="en-US" dirty="0"/>
+              <a:t>().add()</a:t>
             </a:r>
           </a:p>
         </p:txBody>
       </p:sp>
       <p:cxnSp>
         <p:nvCxnSpPr>
-          <p:cNvPr id="13" name="Curved Connector 12"/>
-          <p:cNvCxnSpPr/>
+          <p:cNvPr id="106" name="Straight Arrow Connector 105">
+            <a:extLst>
+              <a:ext uri="{FF2B5EF4-FFF2-40B4-BE49-F238E27FC236}">
+                <a16:creationId xmlns:a16="http://schemas.microsoft.com/office/drawing/2014/main" id="{821898A1-4154-4299-8A89-4439B3BE75E5}"/>
+              </a:ext>
+            </a:extLst>
+          </p:cNvPr>
+          <p:cNvCxnSpPr>
+            <a:cxnSpLocks/>
+          </p:cNvCxnSpPr>
           <p:nvPr/>
         </p:nvCxnSpPr>
         <p:spPr>
-          <a:xfrm rot="16200000" flipH="1">
-            <a:off x="8527578" y="3220579"/>
-            <a:ext cx="156923" cy="76200"/>
-          </a:xfrm>
-          <a:prstGeom prst="curvedConnector4">
-            <a:avLst>
-              <a:gd name="adj1" fmla="val -145677"/>
-              <a:gd name="adj2" fmla="val 400000"/>
-            </a:avLst>
+          <a:xfrm>
+            <a:off x="3647492" y="6125168"/>
+            <a:ext cx="1842143" cy="0"/>
+          </a:xfrm>
+          <a:prstGeom prst="straightConnector1">
+            <a:avLst/>
           </a:prstGeom>
-          <a:ln>
+          <a:ln w="19050">
             <a:solidFill>
-              <a:srgbClr val="7030A0"/>
+              <a:srgbClr val="0070C0"/>
             </a:solidFill>
-            <a:tailEnd type="triangle"/>
+            <a:tailEnd type="arrow"/>
           </a:ln>
         </p:spPr>
         <p:style>
@@ -5259,9 +5306,68 @@
           </a:fontRef>
         </p:style>
       </p:cxnSp>
+      <p:sp>
+        <p:nvSpPr>
+          <p:cNvPr id="107" name="Rectangle 106">
+            <a:extLst>
+              <a:ext uri="{FF2B5EF4-FFF2-40B4-BE49-F238E27FC236}">
+                <a16:creationId xmlns:a16="http://schemas.microsoft.com/office/drawing/2014/main" id="{E18ED78A-DCD8-41EB-8769-FB87D78664F0}"/>
+              </a:ext>
+            </a:extLst>
+          </p:cNvPr>
+          <p:cNvSpPr/>
+          <p:nvPr/>
+        </p:nvSpPr>
+        <p:spPr>
+          <a:xfrm>
+            <a:off x="5486400" y="6105526"/>
+            <a:ext cx="136196" cy="141420"/>
+          </a:xfrm>
+          <a:prstGeom prst="rect">
+            <a:avLst/>
+          </a:prstGeom>
+          <a:solidFill>
+            <a:srgbClr val="0070C0"/>
+          </a:solidFill>
+          <a:ln>
+            <a:solidFill>
+              <a:srgbClr val="0070C0"/>
+            </a:solidFill>
+          </a:ln>
+          <a:effectLst/>
+        </p:spPr>
+        <p:style>
+          <a:lnRef idx="1">
+            <a:schemeClr val="accent3"/>
+          </a:lnRef>
+          <a:fillRef idx="2">
+            <a:schemeClr val="accent3"/>
+          </a:fillRef>
+          <a:effectRef idx="1">
+            <a:schemeClr val="accent3"/>
+          </a:effectRef>
+          <a:fontRef idx="minor">
+            <a:schemeClr val="dk1"/>
+          </a:fontRef>
+        </p:style>
+        <p:txBody>
+          <a:bodyPr rtlCol="0" anchor="ctr"/>
+          <a:lstStyle/>
+          <a:p>
+            <a:pPr algn="ctr"/>
+            <a:endParaRPr lang="en-SG" sz="1400"/>
+          </a:p>
+        </p:txBody>
+      </p:sp>
       <p:cxnSp>
         <p:nvCxnSpPr>
-          <p:cNvPr id="52" name="Straight Arrow Connector 51"/>
+          <p:cNvPr id="108" name="Straight Connector 107">
+            <a:extLst>
+              <a:ext uri="{FF2B5EF4-FFF2-40B4-BE49-F238E27FC236}">
+                <a16:creationId xmlns:a16="http://schemas.microsoft.com/office/drawing/2014/main" id="{A020A76A-69DD-4861-B686-B8BB768E783A}"/>
+              </a:ext>
+            </a:extLst>
+          </p:cNvPr>
           <p:cNvCxnSpPr>
             <a:cxnSpLocks/>
           </p:cNvCxnSpPr>
@@ -5269,8 +5375,1441 @@
         </p:nvCxnSpPr>
         <p:spPr>
           <a:xfrm>
-            <a:off x="7043991" y="3182839"/>
-            <a:ext cx="1470216" cy="0"/>
+            <a:off x="3069553" y="5257800"/>
+            <a:ext cx="2148655" cy="0"/>
+          </a:xfrm>
+          <a:prstGeom prst="line">
+            <a:avLst/>
+          </a:prstGeom>
+          <a:ln w="19050">
+            <a:solidFill>
+              <a:srgbClr val="FF0000"/>
+            </a:solidFill>
+          </a:ln>
+        </p:spPr>
+        <p:style>
+          <a:lnRef idx="1">
+            <a:schemeClr val="accent1"/>
+          </a:lnRef>
+          <a:fillRef idx="0">
+            <a:schemeClr val="accent1"/>
+          </a:fillRef>
+          <a:effectRef idx="0">
+            <a:schemeClr val="accent1"/>
+          </a:effectRef>
+          <a:fontRef idx="minor">
+            <a:schemeClr val="tx1"/>
+          </a:fontRef>
+        </p:style>
+      </p:cxnSp>
+      <p:sp>
+        <p:nvSpPr>
+          <p:cNvPr id="109" name="TextBox 108">
+            <a:extLst>
+              <a:ext uri="{FF2B5EF4-FFF2-40B4-BE49-F238E27FC236}">
+                <a16:creationId xmlns:a16="http://schemas.microsoft.com/office/drawing/2014/main" id="{B73DF19B-9FF2-488F-9845-58A82764EE23}"/>
+              </a:ext>
+            </a:extLst>
+          </p:cNvPr>
+          <p:cNvSpPr txBox="1"/>
+          <p:nvPr/>
+        </p:nvSpPr>
+        <p:spPr>
+          <a:xfrm>
+            <a:off x="3733800" y="5257800"/>
+            <a:ext cx="1300356" cy="261610"/>
+          </a:xfrm>
+          <a:prstGeom prst="rect">
+            <a:avLst/>
+          </a:prstGeom>
+          <a:noFill/>
+        </p:spPr>
+        <p:txBody>
+          <a:bodyPr wrap="none" rtlCol="0">
+            <a:spAutoFit/>
+          </a:bodyPr>
+          <a:lstStyle/>
+          <a:p>
+            <a:r>
+              <a:rPr lang="en-US" sz="1100" dirty="0">
+                <a:solidFill>
+                  <a:srgbClr val="FF0000"/>
+                </a:solidFill>
+              </a:rPr>
+              <a:t>[</a:t>
+            </a:r>
+            <a:r>
+              <a:rPr lang="en-US" sz="1100" dirty="0" err="1">
+                <a:solidFill>
+                  <a:srgbClr val="FF0000"/>
+                </a:solidFill>
+              </a:rPr>
+              <a:t>StatsMode</a:t>
+            </a:r>
+            <a:r>
+              <a:rPr lang="en-US" sz="1100" dirty="0">
+                <a:solidFill>
+                  <a:srgbClr val="FF0000"/>
+                </a:solidFill>
+              </a:rPr>
+              <a:t> is time]</a:t>
+            </a:r>
+          </a:p>
+        </p:txBody>
+      </p:sp>
+      <p:sp>
+        <p:nvSpPr>
+          <p:cNvPr id="110" name="Rectangle 109">
+            <a:extLst>
+              <a:ext uri="{FF2B5EF4-FFF2-40B4-BE49-F238E27FC236}">
+                <a16:creationId xmlns:a16="http://schemas.microsoft.com/office/drawing/2014/main" id="{5D0D3668-F12E-44B2-B3BC-056BCBBC6ED2}"/>
+              </a:ext>
+            </a:extLst>
+          </p:cNvPr>
+          <p:cNvSpPr/>
+          <p:nvPr/>
+        </p:nvSpPr>
+        <p:spPr>
+          <a:xfrm>
+            <a:off x="3616912" y="5797099"/>
+            <a:ext cx="104128" cy="364119"/>
+          </a:xfrm>
+          <a:prstGeom prst="rect">
+            <a:avLst/>
+          </a:prstGeom>
+          <a:solidFill>
+            <a:srgbClr val="0070C0"/>
+          </a:solidFill>
+          <a:ln w="19050">
+            <a:solidFill>
+              <a:schemeClr val="bg1"/>
+            </a:solidFill>
+          </a:ln>
+          <a:effectLst/>
+        </p:spPr>
+        <p:style>
+          <a:lnRef idx="1">
+            <a:schemeClr val="accent3"/>
+          </a:lnRef>
+          <a:fillRef idx="2">
+            <a:schemeClr val="accent3"/>
+          </a:fillRef>
+          <a:effectRef idx="1">
+            <a:schemeClr val="accent3"/>
+          </a:effectRef>
+          <a:fontRef idx="minor">
+            <a:schemeClr val="dk1"/>
+          </a:fontRef>
+        </p:style>
+        <p:txBody>
+          <a:bodyPr rtlCol="0" anchor="ctr"/>
+          <a:lstStyle/>
+          <a:p>
+            <a:pPr algn="ctr"/>
+            <a:endParaRPr lang="en-SG" sz="1400"/>
+          </a:p>
+        </p:txBody>
+      </p:sp>
+      <p:sp>
+        <p:nvSpPr>
+          <p:cNvPr id="76" name="Freeform: Shape 75">
+            <a:extLst>
+              <a:ext uri="{FF2B5EF4-FFF2-40B4-BE49-F238E27FC236}">
+                <a16:creationId xmlns:a16="http://schemas.microsoft.com/office/drawing/2014/main" id="{A857F7A2-39A3-4927-B9DC-6CF18D914241}"/>
+              </a:ext>
+            </a:extLst>
+          </p:cNvPr>
+          <p:cNvSpPr/>
+          <p:nvPr/>
+        </p:nvSpPr>
+        <p:spPr>
+          <a:xfrm>
+            <a:off x="3648075" y="5715000"/>
+            <a:ext cx="168636" cy="131287"/>
+          </a:xfrm>
+          <a:custGeom>
+            <a:avLst/>
+            <a:gdLst>
+              <a:gd name="connsiteX0" fmla="*/ 0 w 168636"/>
+              <a:gd name="connsiteY0" fmla="*/ 2699 h 131287"/>
+              <a:gd name="connsiteX1" fmla="*/ 166688 w 168636"/>
+              <a:gd name="connsiteY1" fmla="*/ 16987 h 131287"/>
+              <a:gd name="connsiteX2" fmla="*/ 76200 w 168636"/>
+              <a:gd name="connsiteY2" fmla="*/ 131287 h 131287"/>
+            </a:gdLst>
+            <a:ahLst/>
+            <a:cxnLst>
+              <a:cxn ang="0">
+                <a:pos x="connsiteX0" y="connsiteY0"/>
+              </a:cxn>
+              <a:cxn ang="0">
+                <a:pos x="connsiteX1" y="connsiteY1"/>
+              </a:cxn>
+              <a:cxn ang="0">
+                <a:pos x="connsiteX2" y="connsiteY2"/>
+              </a:cxn>
+            </a:cxnLst>
+            <a:rect l="l" t="t" r="r" b="b"/>
+            <a:pathLst>
+              <a:path w="168636" h="131287">
+                <a:moveTo>
+                  <a:pt x="0" y="2699"/>
+                </a:moveTo>
+                <a:cubicBezTo>
+                  <a:pt x="76994" y="-873"/>
+                  <a:pt x="153988" y="-4444"/>
+                  <a:pt x="166688" y="16987"/>
+                </a:cubicBezTo>
+                <a:cubicBezTo>
+                  <a:pt x="179388" y="38418"/>
+                  <a:pt x="127794" y="84852"/>
+                  <a:pt x="76200" y="131287"/>
+                </a:cubicBezTo>
+              </a:path>
+            </a:pathLst>
+          </a:custGeom>
+          <a:ln w="19050">
+            <a:solidFill>
+              <a:srgbClr val="0070C0"/>
+            </a:solidFill>
+            <a:tailEnd type="arrow"/>
+          </a:ln>
+        </p:spPr>
+        <p:style>
+          <a:lnRef idx="1">
+            <a:schemeClr val="accent1"/>
+          </a:lnRef>
+          <a:fillRef idx="0">
+            <a:schemeClr val="accent1"/>
+          </a:fillRef>
+          <a:effectRef idx="0">
+            <a:schemeClr val="accent1"/>
+          </a:effectRef>
+          <a:fontRef idx="minor">
+            <a:schemeClr val="tx1"/>
+          </a:fontRef>
+        </p:style>
+        <p:txBody>
+          <a:bodyPr rtlCol="0" anchor="ctr"/>
+          <a:lstStyle/>
+          <a:p>
+            <a:pPr algn="ctr"/>
+            <a:endParaRPr lang="en-US" dirty="0"/>
+          </a:p>
+        </p:txBody>
+      </p:sp>
+      <p:sp>
+        <p:nvSpPr>
+          <p:cNvPr id="111" name="TextBox 110">
+            <a:extLst>
+              <a:ext uri="{FF2B5EF4-FFF2-40B4-BE49-F238E27FC236}">
+                <a16:creationId xmlns:a16="http://schemas.microsoft.com/office/drawing/2014/main" id="{93597ED7-7DB0-4260-BCB5-9039D94B332C}"/>
+              </a:ext>
+            </a:extLst>
+          </p:cNvPr>
+          <p:cNvSpPr txBox="1"/>
+          <p:nvPr/>
+        </p:nvSpPr>
+        <p:spPr>
+          <a:xfrm>
+            <a:off x="3434449" y="5562600"/>
+            <a:ext cx="1899551" cy="169277"/>
+          </a:xfrm>
+          <a:prstGeom prst="rect">
+            <a:avLst/>
+          </a:prstGeom>
+          <a:noFill/>
+        </p:spPr>
+        <p:txBody>
+          <a:bodyPr wrap="square" lIns="0" tIns="0" rIns="0" bIns="0" rtlCol="0">
+            <a:spAutoFit/>
+          </a:bodyPr>
+          <a:lstStyle>
+            <a:defPPr>
+              <a:defRPr lang="en-US"/>
+            </a:defPPr>
+            <a:lvl1pPr algn="r">
+              <a:defRPr sz="1400">
+                <a:solidFill>
+                  <a:srgbClr val="0070C0"/>
+                </a:solidFill>
+              </a:defRPr>
+            </a:lvl1pPr>
+          </a:lstStyle>
+          <a:p>
+            <a:pPr algn="ctr"/>
+            <a:r>
+              <a:rPr lang="en-US" sz="1100" dirty="0" err="1"/>
+              <a:t>setTimeBasedData</a:t>
+            </a:r>
+            <a:r>
+              <a:rPr lang="en-US" sz="1100" dirty="0"/>
+              <a:t>()</a:t>
+            </a:r>
+          </a:p>
+        </p:txBody>
+      </p:sp>
+      <p:cxnSp>
+        <p:nvCxnSpPr>
+          <p:cNvPr id="112" name="Straight Connector 111">
+            <a:extLst>
+              <a:ext uri="{FF2B5EF4-FFF2-40B4-BE49-F238E27FC236}">
+                <a16:creationId xmlns:a16="http://schemas.microsoft.com/office/drawing/2014/main" id="{8D4F4E76-F30E-4CD2-A773-4EA4B4CB6148}"/>
+              </a:ext>
+            </a:extLst>
+          </p:cNvPr>
+          <p:cNvCxnSpPr>
+            <a:cxnSpLocks/>
+          </p:cNvCxnSpPr>
+          <p:nvPr/>
+        </p:nvCxnSpPr>
+        <p:spPr>
+          <a:xfrm>
+            <a:off x="3067052" y="6253163"/>
+            <a:ext cx="2148655" cy="0"/>
+          </a:xfrm>
+          <a:prstGeom prst="line">
+            <a:avLst/>
+          </a:prstGeom>
+          <a:ln w="19050">
+            <a:solidFill>
+              <a:srgbClr val="FF0000"/>
+            </a:solidFill>
+          </a:ln>
+        </p:spPr>
+        <p:style>
+          <a:lnRef idx="1">
+            <a:schemeClr val="accent1"/>
+          </a:lnRef>
+          <a:fillRef idx="0">
+            <a:schemeClr val="accent1"/>
+          </a:fillRef>
+          <a:effectRef idx="0">
+            <a:schemeClr val="accent1"/>
+          </a:effectRef>
+          <a:fontRef idx="minor">
+            <a:schemeClr val="tx1"/>
+          </a:fontRef>
+        </p:style>
+      </p:cxnSp>
+      <p:sp>
+        <p:nvSpPr>
+          <p:cNvPr id="113" name="TextBox 112">
+            <a:extLst>
+              <a:ext uri="{FF2B5EF4-FFF2-40B4-BE49-F238E27FC236}">
+                <a16:creationId xmlns:a16="http://schemas.microsoft.com/office/drawing/2014/main" id="{9D8548F9-D414-4EA8-92F5-E31A1E081F53}"/>
+              </a:ext>
+            </a:extLst>
+          </p:cNvPr>
+          <p:cNvSpPr txBox="1"/>
+          <p:nvPr/>
+        </p:nvSpPr>
+        <p:spPr>
+          <a:xfrm>
+            <a:off x="3731299" y="6253163"/>
+            <a:ext cx="1535998" cy="261610"/>
+          </a:xfrm>
+          <a:prstGeom prst="rect">
+            <a:avLst/>
+          </a:prstGeom>
+          <a:noFill/>
+        </p:spPr>
+        <p:txBody>
+          <a:bodyPr wrap="none" rtlCol="0">
+            <a:spAutoFit/>
+          </a:bodyPr>
+          <a:lstStyle/>
+          <a:p>
+            <a:r>
+              <a:rPr lang="en-US" sz="1100" dirty="0">
+                <a:solidFill>
+                  <a:srgbClr val="FF0000"/>
+                </a:solidFill>
+              </a:rPr>
+              <a:t>[</a:t>
+            </a:r>
+            <a:r>
+              <a:rPr lang="en-US" sz="1100" dirty="0" err="1">
+                <a:solidFill>
+                  <a:srgbClr val="FF0000"/>
+                </a:solidFill>
+              </a:rPr>
+              <a:t>StatsMode</a:t>
+            </a:r>
+            <a:r>
+              <a:rPr lang="en-US" sz="1100" dirty="0">
+                <a:solidFill>
+                  <a:srgbClr val="FF0000"/>
+                </a:solidFill>
+              </a:rPr>
+              <a:t> is category]</a:t>
+            </a:r>
+          </a:p>
+        </p:txBody>
+      </p:sp>
+      <p:sp>
+        <p:nvSpPr>
+          <p:cNvPr id="114" name="TextBox 113">
+            <a:extLst>
+              <a:ext uri="{FF2B5EF4-FFF2-40B4-BE49-F238E27FC236}">
+                <a16:creationId xmlns:a16="http://schemas.microsoft.com/office/drawing/2014/main" id="{75DD7D32-8FB5-4378-8C33-7809ADA8654C}"/>
+              </a:ext>
+            </a:extLst>
+          </p:cNvPr>
+          <p:cNvSpPr txBox="1"/>
+          <p:nvPr/>
+        </p:nvSpPr>
+        <p:spPr>
+          <a:xfrm>
+            <a:off x="3499751" y="6859454"/>
+            <a:ext cx="1899551" cy="215444"/>
+          </a:xfrm>
+          <a:prstGeom prst="rect">
+            <a:avLst/>
+          </a:prstGeom>
+          <a:noFill/>
+        </p:spPr>
+        <p:txBody>
+          <a:bodyPr wrap="square" lIns="0" tIns="0" rIns="0" bIns="0" rtlCol="0">
+            <a:spAutoFit/>
+          </a:bodyPr>
+          <a:lstStyle>
+            <a:defPPr>
+              <a:defRPr lang="en-US"/>
+            </a:defPPr>
+            <a:lvl1pPr algn="r">
+              <a:defRPr sz="1400">
+                <a:solidFill>
+                  <a:srgbClr val="0070C0"/>
+                </a:solidFill>
+              </a:defRPr>
+            </a:lvl1pPr>
+          </a:lstStyle>
+          <a:p>
+            <a:pPr algn="ctr"/>
+            <a:r>
+              <a:rPr lang="en-US" dirty="0" err="1"/>
+              <a:t>getChildren</a:t>
+            </a:r>
+            <a:r>
+              <a:rPr lang="en-US" dirty="0"/>
+              <a:t>().add()</a:t>
+            </a:r>
+          </a:p>
+        </p:txBody>
+      </p:sp>
+      <p:cxnSp>
+        <p:nvCxnSpPr>
+          <p:cNvPr id="115" name="Straight Arrow Connector 114">
+            <a:extLst>
+              <a:ext uri="{FF2B5EF4-FFF2-40B4-BE49-F238E27FC236}">
+                <a16:creationId xmlns:a16="http://schemas.microsoft.com/office/drawing/2014/main" id="{8E800139-F6E6-4C6E-B4F2-1B05D75FB979}"/>
+              </a:ext>
+            </a:extLst>
+          </p:cNvPr>
+          <p:cNvCxnSpPr>
+            <a:cxnSpLocks/>
+          </p:cNvCxnSpPr>
+          <p:nvPr/>
+        </p:nvCxnSpPr>
+        <p:spPr>
+          <a:xfrm>
+            <a:off x="3642043" y="7117222"/>
+            <a:ext cx="1842143" cy="0"/>
+          </a:xfrm>
+          <a:prstGeom prst="straightConnector1">
+            <a:avLst/>
+          </a:prstGeom>
+          <a:ln w="19050">
+            <a:solidFill>
+              <a:srgbClr val="0070C0"/>
+            </a:solidFill>
+            <a:tailEnd type="arrow"/>
+          </a:ln>
+        </p:spPr>
+        <p:style>
+          <a:lnRef idx="1">
+            <a:schemeClr val="accent1"/>
+          </a:lnRef>
+          <a:fillRef idx="0">
+            <a:schemeClr val="accent1"/>
+          </a:fillRef>
+          <a:effectRef idx="0">
+            <a:schemeClr val="accent1"/>
+          </a:effectRef>
+          <a:fontRef idx="minor">
+            <a:schemeClr val="tx1"/>
+          </a:fontRef>
+        </p:style>
+      </p:cxnSp>
+      <p:sp>
+        <p:nvSpPr>
+          <p:cNvPr id="116" name="Rectangle 115">
+            <a:extLst>
+              <a:ext uri="{FF2B5EF4-FFF2-40B4-BE49-F238E27FC236}">
+                <a16:creationId xmlns:a16="http://schemas.microsoft.com/office/drawing/2014/main" id="{18193099-3211-4289-B4DE-ED74AEC0C180}"/>
+              </a:ext>
+            </a:extLst>
+          </p:cNvPr>
+          <p:cNvSpPr/>
+          <p:nvPr/>
+        </p:nvSpPr>
+        <p:spPr>
+          <a:xfrm>
+            <a:off x="5480951" y="7097580"/>
+            <a:ext cx="136196" cy="141420"/>
+          </a:xfrm>
+          <a:prstGeom prst="rect">
+            <a:avLst/>
+          </a:prstGeom>
+          <a:solidFill>
+            <a:srgbClr val="0070C0"/>
+          </a:solidFill>
+          <a:ln>
+            <a:solidFill>
+              <a:srgbClr val="0070C0"/>
+            </a:solidFill>
+          </a:ln>
+          <a:effectLst/>
+        </p:spPr>
+        <p:style>
+          <a:lnRef idx="1">
+            <a:schemeClr val="accent3"/>
+          </a:lnRef>
+          <a:fillRef idx="2">
+            <a:schemeClr val="accent3"/>
+          </a:fillRef>
+          <a:effectRef idx="1">
+            <a:schemeClr val="accent3"/>
+          </a:effectRef>
+          <a:fontRef idx="minor">
+            <a:schemeClr val="dk1"/>
+          </a:fontRef>
+        </p:style>
+        <p:txBody>
+          <a:bodyPr rtlCol="0" anchor="ctr"/>
+          <a:lstStyle/>
+          <a:p>
+            <a:pPr algn="ctr"/>
+            <a:endParaRPr lang="en-SG" sz="1400"/>
+          </a:p>
+        </p:txBody>
+      </p:sp>
+      <p:sp>
+        <p:nvSpPr>
+          <p:cNvPr id="117" name="Rectangle 116">
+            <a:extLst>
+              <a:ext uri="{FF2B5EF4-FFF2-40B4-BE49-F238E27FC236}">
+                <a16:creationId xmlns:a16="http://schemas.microsoft.com/office/drawing/2014/main" id="{B11DA4FC-2B6A-4513-AD9C-4BADF080EA8E}"/>
+              </a:ext>
+            </a:extLst>
+          </p:cNvPr>
+          <p:cNvSpPr/>
+          <p:nvPr/>
+        </p:nvSpPr>
+        <p:spPr>
+          <a:xfrm>
+            <a:off x="3611463" y="6789153"/>
+            <a:ext cx="104128" cy="364119"/>
+          </a:xfrm>
+          <a:prstGeom prst="rect">
+            <a:avLst/>
+          </a:prstGeom>
+          <a:solidFill>
+            <a:srgbClr val="0070C0"/>
+          </a:solidFill>
+          <a:ln w="19050">
+            <a:solidFill>
+              <a:schemeClr val="bg1"/>
+            </a:solidFill>
+          </a:ln>
+          <a:effectLst/>
+        </p:spPr>
+        <p:style>
+          <a:lnRef idx="1">
+            <a:schemeClr val="accent3"/>
+          </a:lnRef>
+          <a:fillRef idx="2">
+            <a:schemeClr val="accent3"/>
+          </a:fillRef>
+          <a:effectRef idx="1">
+            <a:schemeClr val="accent3"/>
+          </a:effectRef>
+          <a:fontRef idx="minor">
+            <a:schemeClr val="dk1"/>
+          </a:fontRef>
+        </p:style>
+        <p:txBody>
+          <a:bodyPr rtlCol="0" anchor="ctr"/>
+          <a:lstStyle/>
+          <a:p>
+            <a:pPr algn="ctr"/>
+            <a:endParaRPr lang="en-SG" sz="1400"/>
+          </a:p>
+        </p:txBody>
+      </p:sp>
+      <p:sp>
+        <p:nvSpPr>
+          <p:cNvPr id="118" name="Freeform: Shape 117">
+            <a:extLst>
+              <a:ext uri="{FF2B5EF4-FFF2-40B4-BE49-F238E27FC236}">
+                <a16:creationId xmlns:a16="http://schemas.microsoft.com/office/drawing/2014/main" id="{2CF4358A-1221-4B5F-AD54-AED254B4CA66}"/>
+              </a:ext>
+            </a:extLst>
+          </p:cNvPr>
+          <p:cNvSpPr/>
+          <p:nvPr/>
+        </p:nvSpPr>
+        <p:spPr>
+          <a:xfrm>
+            <a:off x="3642626" y="6707054"/>
+            <a:ext cx="168636" cy="131287"/>
+          </a:xfrm>
+          <a:custGeom>
+            <a:avLst/>
+            <a:gdLst>
+              <a:gd name="connsiteX0" fmla="*/ 0 w 168636"/>
+              <a:gd name="connsiteY0" fmla="*/ 2699 h 131287"/>
+              <a:gd name="connsiteX1" fmla="*/ 166688 w 168636"/>
+              <a:gd name="connsiteY1" fmla="*/ 16987 h 131287"/>
+              <a:gd name="connsiteX2" fmla="*/ 76200 w 168636"/>
+              <a:gd name="connsiteY2" fmla="*/ 131287 h 131287"/>
+            </a:gdLst>
+            <a:ahLst/>
+            <a:cxnLst>
+              <a:cxn ang="0">
+                <a:pos x="connsiteX0" y="connsiteY0"/>
+              </a:cxn>
+              <a:cxn ang="0">
+                <a:pos x="connsiteX1" y="connsiteY1"/>
+              </a:cxn>
+              <a:cxn ang="0">
+                <a:pos x="connsiteX2" y="connsiteY2"/>
+              </a:cxn>
+            </a:cxnLst>
+            <a:rect l="l" t="t" r="r" b="b"/>
+            <a:pathLst>
+              <a:path w="168636" h="131287">
+                <a:moveTo>
+                  <a:pt x="0" y="2699"/>
+                </a:moveTo>
+                <a:cubicBezTo>
+                  <a:pt x="76994" y="-873"/>
+                  <a:pt x="153988" y="-4444"/>
+                  <a:pt x="166688" y="16987"/>
+                </a:cubicBezTo>
+                <a:cubicBezTo>
+                  <a:pt x="179388" y="38418"/>
+                  <a:pt x="127794" y="84852"/>
+                  <a:pt x="76200" y="131287"/>
+                </a:cubicBezTo>
+              </a:path>
+            </a:pathLst>
+          </a:custGeom>
+          <a:ln w="19050">
+            <a:solidFill>
+              <a:srgbClr val="0070C0"/>
+            </a:solidFill>
+            <a:tailEnd type="arrow"/>
+          </a:ln>
+        </p:spPr>
+        <p:style>
+          <a:lnRef idx="1">
+            <a:schemeClr val="accent1"/>
+          </a:lnRef>
+          <a:fillRef idx="0">
+            <a:schemeClr val="accent1"/>
+          </a:fillRef>
+          <a:effectRef idx="0">
+            <a:schemeClr val="accent1"/>
+          </a:effectRef>
+          <a:fontRef idx="minor">
+            <a:schemeClr val="tx1"/>
+          </a:fontRef>
+        </p:style>
+        <p:txBody>
+          <a:bodyPr rtlCol="0" anchor="ctr"/>
+          <a:lstStyle/>
+          <a:p>
+            <a:pPr algn="ctr"/>
+            <a:endParaRPr lang="en-US" dirty="0"/>
+          </a:p>
+        </p:txBody>
+      </p:sp>
+      <p:sp>
+        <p:nvSpPr>
+          <p:cNvPr id="119" name="TextBox 118">
+            <a:extLst>
+              <a:ext uri="{FF2B5EF4-FFF2-40B4-BE49-F238E27FC236}">
+                <a16:creationId xmlns:a16="http://schemas.microsoft.com/office/drawing/2014/main" id="{876A6D69-3070-4DE3-A54A-BCB57D54EBCD}"/>
+              </a:ext>
+            </a:extLst>
+          </p:cNvPr>
+          <p:cNvSpPr txBox="1"/>
+          <p:nvPr/>
+        </p:nvSpPr>
+        <p:spPr>
+          <a:xfrm>
+            <a:off x="3543984" y="6531560"/>
+            <a:ext cx="1899551" cy="169277"/>
+          </a:xfrm>
+          <a:prstGeom prst="rect">
+            <a:avLst/>
+          </a:prstGeom>
+          <a:noFill/>
+        </p:spPr>
+        <p:txBody>
+          <a:bodyPr wrap="square" lIns="0" tIns="0" rIns="0" bIns="0" rtlCol="0">
+            <a:spAutoFit/>
+          </a:bodyPr>
+          <a:lstStyle>
+            <a:defPPr>
+              <a:defRPr lang="en-US"/>
+            </a:defPPr>
+            <a:lvl1pPr algn="r">
+              <a:defRPr sz="1400">
+                <a:solidFill>
+                  <a:srgbClr val="0070C0"/>
+                </a:solidFill>
+              </a:defRPr>
+            </a:lvl1pPr>
+          </a:lstStyle>
+          <a:p>
+            <a:pPr algn="ctr"/>
+            <a:r>
+              <a:rPr lang="en-US" sz="1100" dirty="0" err="1"/>
+              <a:t>setCategoryBasedData</a:t>
+            </a:r>
+            <a:r>
+              <a:rPr lang="en-US" sz="1100" dirty="0"/>
+              <a:t>()</a:t>
+            </a:r>
+          </a:p>
+        </p:txBody>
+      </p:sp>
+      <p:grpSp>
+        <p:nvGrpSpPr>
+          <p:cNvPr id="133" name="Group 132">
+            <a:extLst>
+              <a:ext uri="{FF2B5EF4-FFF2-40B4-BE49-F238E27FC236}">
+                <a16:creationId xmlns:a16="http://schemas.microsoft.com/office/drawing/2014/main" id="{04125360-A025-4953-B205-47A5A9A959AF}"/>
+              </a:ext>
+            </a:extLst>
+          </p:cNvPr>
+          <p:cNvGrpSpPr/>
+          <p:nvPr/>
+        </p:nvGrpSpPr>
+        <p:grpSpPr>
+          <a:xfrm>
+            <a:off x="3166484" y="876330"/>
+            <a:ext cx="841636" cy="2779096"/>
+            <a:chOff x="3166484" y="876330"/>
+            <a:chExt cx="841636" cy="2779096"/>
+          </a:xfrm>
+        </p:grpSpPr>
+        <p:grpSp>
+          <p:nvGrpSpPr>
+            <p:cNvPr id="124" name="Group 123">
+              <a:extLst>
+                <a:ext uri="{FF2B5EF4-FFF2-40B4-BE49-F238E27FC236}">
+                  <a16:creationId xmlns:a16="http://schemas.microsoft.com/office/drawing/2014/main" id="{05C75A28-0C85-4123-87FE-62803914DAEB}"/>
+                </a:ext>
+              </a:extLst>
+            </p:cNvPr>
+            <p:cNvGrpSpPr/>
+            <p:nvPr/>
+          </p:nvGrpSpPr>
+          <p:grpSpPr>
+            <a:xfrm>
+              <a:off x="3166484" y="876330"/>
+              <a:ext cx="841636" cy="2779096"/>
+              <a:chOff x="4327217" y="543946"/>
+              <a:chExt cx="841636" cy="2779096"/>
+            </a:xfrm>
+          </p:grpSpPr>
+          <p:sp>
+            <p:nvSpPr>
+              <p:cNvPr id="40" name="Rectangle 62"/>
+              <p:cNvSpPr/>
+              <p:nvPr/>
+            </p:nvSpPr>
+            <p:spPr>
+              <a:xfrm>
+                <a:off x="4327217" y="543946"/>
+                <a:ext cx="841636" cy="300180"/>
+              </a:xfrm>
+              <a:prstGeom prst="rect">
+                <a:avLst/>
+              </a:prstGeom>
+              <a:solidFill>
+                <a:srgbClr val="7030A0"/>
+              </a:solidFill>
+              <a:ln w="19050">
+                <a:solidFill>
+                  <a:srgbClr val="7030A0"/>
+                </a:solidFill>
+              </a:ln>
+              <a:effectLst/>
+            </p:spPr>
+            <p:style>
+              <a:lnRef idx="1">
+                <a:schemeClr val="accent2"/>
+              </a:lnRef>
+              <a:fillRef idx="2">
+                <a:schemeClr val="accent2"/>
+              </a:fillRef>
+              <a:effectRef idx="1">
+                <a:schemeClr val="accent2"/>
+              </a:effectRef>
+              <a:fontRef idx="minor">
+                <a:schemeClr val="dk1"/>
+              </a:fontRef>
+            </p:style>
+            <p:txBody>
+              <a:bodyPr rtlCol="0" anchor="ctr"/>
+              <a:lstStyle/>
+              <a:p>
+                <a:pPr algn="ctr"/>
+                <a:r>
+                  <a:rPr lang="en-US" sz="1600" dirty="0">
+                    <a:solidFill>
+                      <a:schemeClr val="bg1"/>
+                    </a:solidFill>
+                  </a:rPr>
+                  <a:t>: Logic</a:t>
+                </a:r>
+                <a:endParaRPr lang="en-SG" sz="1600" dirty="0">
+                  <a:solidFill>
+                    <a:schemeClr val="bg1"/>
+                  </a:solidFill>
+                </a:endParaRPr>
+              </a:p>
+            </p:txBody>
+          </p:sp>
+          <p:cxnSp>
+            <p:nvCxnSpPr>
+              <p:cNvPr id="46" name="Straight Connector 45"/>
+              <p:cNvCxnSpPr>
+                <a:cxnSpLocks/>
+              </p:cNvCxnSpPr>
+              <p:nvPr/>
+            </p:nvCxnSpPr>
+            <p:spPr>
+              <a:xfrm flipH="1">
+                <a:off x="4767902" y="781786"/>
+                <a:ext cx="1" cy="2541256"/>
+              </a:xfrm>
+              <a:prstGeom prst="line">
+                <a:avLst/>
+              </a:prstGeom>
+              <a:ln w="19050">
+                <a:solidFill>
+                  <a:srgbClr val="7030A0"/>
+                </a:solidFill>
+                <a:prstDash val="sysDash"/>
+              </a:ln>
+              <a:effectLst/>
+            </p:spPr>
+            <p:style>
+              <a:lnRef idx="1">
+                <a:schemeClr val="accent1"/>
+              </a:lnRef>
+              <a:fillRef idx="2">
+                <a:schemeClr val="accent1"/>
+              </a:fillRef>
+              <a:effectRef idx="1">
+                <a:schemeClr val="accent1"/>
+              </a:effectRef>
+              <a:fontRef idx="minor">
+                <a:schemeClr val="dk1"/>
+              </a:fontRef>
+            </p:style>
+          </p:cxnSp>
+          <p:sp>
+            <p:nvSpPr>
+              <p:cNvPr id="49" name="Rectangle 48"/>
+              <p:cNvSpPr/>
+              <p:nvPr/>
+            </p:nvSpPr>
+            <p:spPr>
+              <a:xfrm>
+                <a:off x="4664978" y="1086586"/>
+                <a:ext cx="207385" cy="270468"/>
+              </a:xfrm>
+              <a:prstGeom prst="rect">
+                <a:avLst/>
+              </a:prstGeom>
+              <a:solidFill>
+                <a:srgbClr val="7030A0"/>
+              </a:solidFill>
+              <a:ln>
+                <a:solidFill>
+                  <a:srgbClr val="7030A0"/>
+                </a:solidFill>
+              </a:ln>
+              <a:effectLst/>
+            </p:spPr>
+            <p:style>
+              <a:lnRef idx="1">
+                <a:schemeClr val="accent3"/>
+              </a:lnRef>
+              <a:fillRef idx="2">
+                <a:schemeClr val="accent3"/>
+              </a:fillRef>
+              <a:effectRef idx="1">
+                <a:schemeClr val="accent3"/>
+              </a:effectRef>
+              <a:fontRef idx="minor">
+                <a:schemeClr val="dk1"/>
+              </a:fontRef>
+            </p:style>
+            <p:txBody>
+              <a:bodyPr rtlCol="0" anchor="ctr"/>
+              <a:lstStyle/>
+              <a:p>
+                <a:pPr algn="ctr"/>
+                <a:endParaRPr lang="en-SG" sz="1400"/>
+              </a:p>
+            </p:txBody>
+          </p:sp>
+        </p:grpSp>
+        <p:sp>
+          <p:nvSpPr>
+            <p:cNvPr id="126" name="Rectangle 125">
+              <a:extLst>
+                <a:ext uri="{FF2B5EF4-FFF2-40B4-BE49-F238E27FC236}">
+                  <a16:creationId xmlns:a16="http://schemas.microsoft.com/office/drawing/2014/main" id="{8AD5B429-6FFE-4679-9481-76EF52CEE8AB}"/>
+                </a:ext>
+              </a:extLst>
+            </p:cNvPr>
+            <p:cNvSpPr/>
+            <p:nvPr/>
+          </p:nvSpPr>
+          <p:spPr>
+            <a:xfrm>
+              <a:off x="3505200" y="1973580"/>
+              <a:ext cx="207385" cy="270468"/>
+            </a:xfrm>
+            <a:prstGeom prst="rect">
+              <a:avLst/>
+            </a:prstGeom>
+            <a:solidFill>
+              <a:srgbClr val="7030A0"/>
+            </a:solidFill>
+            <a:ln>
+              <a:solidFill>
+                <a:srgbClr val="7030A0"/>
+              </a:solidFill>
+            </a:ln>
+            <a:effectLst/>
+          </p:spPr>
+          <p:style>
+            <a:lnRef idx="1">
+              <a:schemeClr val="accent3"/>
+            </a:lnRef>
+            <a:fillRef idx="2">
+              <a:schemeClr val="accent3"/>
+            </a:fillRef>
+            <a:effectRef idx="1">
+              <a:schemeClr val="accent3"/>
+            </a:effectRef>
+            <a:fontRef idx="minor">
+              <a:schemeClr val="dk1"/>
+            </a:fontRef>
+          </p:style>
+          <p:txBody>
+            <a:bodyPr rtlCol="0" anchor="ctr"/>
+            <a:lstStyle/>
+            <a:p>
+              <a:pPr algn="ctr"/>
+              <a:endParaRPr lang="en-SG" sz="1400"/>
+            </a:p>
+          </p:txBody>
+        </p:sp>
+        <p:sp>
+          <p:nvSpPr>
+            <p:cNvPr id="127" name="Rectangle 126">
+              <a:extLst>
+                <a:ext uri="{FF2B5EF4-FFF2-40B4-BE49-F238E27FC236}">
+                  <a16:creationId xmlns:a16="http://schemas.microsoft.com/office/drawing/2014/main" id="{B20668F7-AA2B-449F-8F7A-7F585A175B1C}"/>
+                </a:ext>
+              </a:extLst>
+            </p:cNvPr>
+            <p:cNvSpPr/>
+            <p:nvPr/>
+          </p:nvSpPr>
+          <p:spPr>
+            <a:xfrm>
+              <a:off x="3505200" y="2590800"/>
+              <a:ext cx="207385" cy="245880"/>
+            </a:xfrm>
+            <a:prstGeom prst="rect">
+              <a:avLst/>
+            </a:prstGeom>
+            <a:solidFill>
+              <a:srgbClr val="7030A0"/>
+            </a:solidFill>
+            <a:ln>
+              <a:solidFill>
+                <a:srgbClr val="7030A0"/>
+              </a:solidFill>
+            </a:ln>
+            <a:effectLst/>
+          </p:spPr>
+          <p:style>
+            <a:lnRef idx="1">
+              <a:schemeClr val="accent3"/>
+            </a:lnRef>
+            <a:fillRef idx="2">
+              <a:schemeClr val="accent3"/>
+            </a:fillRef>
+            <a:effectRef idx="1">
+              <a:schemeClr val="accent3"/>
+            </a:effectRef>
+            <a:fontRef idx="minor">
+              <a:schemeClr val="dk1"/>
+            </a:fontRef>
+          </p:style>
+          <p:txBody>
+            <a:bodyPr rtlCol="0" anchor="ctr"/>
+            <a:lstStyle/>
+            <a:p>
+              <a:pPr algn="ctr"/>
+              <a:endParaRPr lang="en-SG" sz="1400"/>
+            </a:p>
+          </p:txBody>
+        </p:sp>
+        <p:sp>
+          <p:nvSpPr>
+            <p:cNvPr id="128" name="Rectangle 127">
+              <a:extLst>
+                <a:ext uri="{FF2B5EF4-FFF2-40B4-BE49-F238E27FC236}">
+                  <a16:creationId xmlns:a16="http://schemas.microsoft.com/office/drawing/2014/main" id="{67AB965B-EBE3-4E8D-BD1A-A00C95109B72}"/>
+                </a:ext>
+              </a:extLst>
+            </p:cNvPr>
+            <p:cNvSpPr/>
+            <p:nvPr/>
+          </p:nvSpPr>
+          <p:spPr>
+            <a:xfrm>
+              <a:off x="3526415" y="3200400"/>
+              <a:ext cx="207385" cy="245880"/>
+            </a:xfrm>
+            <a:prstGeom prst="rect">
+              <a:avLst/>
+            </a:prstGeom>
+            <a:solidFill>
+              <a:srgbClr val="7030A0"/>
+            </a:solidFill>
+            <a:ln>
+              <a:solidFill>
+                <a:srgbClr val="7030A0"/>
+              </a:solidFill>
+            </a:ln>
+            <a:effectLst/>
+          </p:spPr>
+          <p:style>
+            <a:lnRef idx="1">
+              <a:schemeClr val="accent3"/>
+            </a:lnRef>
+            <a:fillRef idx="2">
+              <a:schemeClr val="accent3"/>
+            </a:fillRef>
+            <a:effectRef idx="1">
+              <a:schemeClr val="accent3"/>
+            </a:effectRef>
+            <a:fontRef idx="minor">
+              <a:schemeClr val="dk1"/>
+            </a:fontRef>
+          </p:style>
+          <p:txBody>
+            <a:bodyPr rtlCol="0" anchor="ctr"/>
+            <a:lstStyle/>
+            <a:p>
+              <a:pPr algn="ctr"/>
+              <a:endParaRPr lang="en-SG" sz="1400"/>
+            </a:p>
+          </p:txBody>
+        </p:sp>
+      </p:grpSp>
+      <p:grpSp>
+        <p:nvGrpSpPr>
+          <p:cNvPr id="134" name="Group 133">
+            <a:extLst>
+              <a:ext uri="{FF2B5EF4-FFF2-40B4-BE49-F238E27FC236}">
+                <a16:creationId xmlns:a16="http://schemas.microsoft.com/office/drawing/2014/main" id="{1E3EB36A-68B2-4A67-ADF4-DF5D825F8059}"/>
+              </a:ext>
+            </a:extLst>
+          </p:cNvPr>
+          <p:cNvGrpSpPr/>
+          <p:nvPr/>
+        </p:nvGrpSpPr>
+        <p:grpSpPr>
+          <a:xfrm>
+            <a:off x="5181600" y="878504"/>
+            <a:ext cx="841636" cy="2779096"/>
+            <a:chOff x="3166484" y="876330"/>
+            <a:chExt cx="841636" cy="2779096"/>
+          </a:xfrm>
+          <a:solidFill>
+            <a:srgbClr val="00B050"/>
+          </a:solidFill>
+        </p:grpSpPr>
+        <p:grpSp>
+          <p:nvGrpSpPr>
+            <p:cNvPr id="135" name="Group 134">
+              <a:extLst>
+                <a:ext uri="{FF2B5EF4-FFF2-40B4-BE49-F238E27FC236}">
+                  <a16:creationId xmlns:a16="http://schemas.microsoft.com/office/drawing/2014/main" id="{685E47F2-8B36-4B1B-BE63-63F79746C903}"/>
+                </a:ext>
+              </a:extLst>
+            </p:cNvPr>
+            <p:cNvGrpSpPr/>
+            <p:nvPr/>
+          </p:nvGrpSpPr>
+          <p:grpSpPr>
+            <a:xfrm>
+              <a:off x="3166484" y="876330"/>
+              <a:ext cx="841636" cy="2779096"/>
+              <a:chOff x="4327217" y="543946"/>
+              <a:chExt cx="841636" cy="2779096"/>
+            </a:xfrm>
+            <a:grpFill/>
+          </p:grpSpPr>
+          <p:sp>
+            <p:nvSpPr>
+              <p:cNvPr id="139" name="Rectangle 62">
+                <a:extLst>
+                  <a:ext uri="{FF2B5EF4-FFF2-40B4-BE49-F238E27FC236}">
+                    <a16:creationId xmlns:a16="http://schemas.microsoft.com/office/drawing/2014/main" id="{38851D16-AC90-4CD4-92C2-C04607FB0268}"/>
+                  </a:ext>
+                </a:extLst>
+              </p:cNvPr>
+              <p:cNvSpPr/>
+              <p:nvPr/>
+            </p:nvSpPr>
+            <p:spPr>
+              <a:xfrm>
+                <a:off x="4327217" y="543946"/>
+                <a:ext cx="841636" cy="300180"/>
+              </a:xfrm>
+              <a:prstGeom prst="rect">
+                <a:avLst/>
+              </a:prstGeom>
+              <a:grpFill/>
+              <a:ln w="19050">
+                <a:solidFill>
+                  <a:srgbClr val="00B050"/>
+                </a:solidFill>
+              </a:ln>
+              <a:effectLst/>
+            </p:spPr>
+            <p:style>
+              <a:lnRef idx="1">
+                <a:schemeClr val="accent2"/>
+              </a:lnRef>
+              <a:fillRef idx="2">
+                <a:schemeClr val="accent2"/>
+              </a:fillRef>
+              <a:effectRef idx="1">
+                <a:schemeClr val="accent2"/>
+              </a:effectRef>
+              <a:fontRef idx="minor">
+                <a:schemeClr val="dk1"/>
+              </a:fontRef>
+            </p:style>
+            <p:txBody>
+              <a:bodyPr rtlCol="0" anchor="ctr"/>
+              <a:lstStyle/>
+              <a:p>
+                <a:pPr algn="ctr"/>
+                <a:r>
+                  <a:rPr lang="en-US" sz="1600" dirty="0">
+                    <a:solidFill>
+                      <a:schemeClr val="bg1"/>
+                    </a:solidFill>
+                  </a:rPr>
+                  <a:t>: Model</a:t>
+                </a:r>
+                <a:endParaRPr lang="en-SG" sz="1600" dirty="0">
+                  <a:solidFill>
+                    <a:schemeClr val="bg1"/>
+                  </a:solidFill>
+                </a:endParaRPr>
+              </a:p>
+            </p:txBody>
+          </p:sp>
+          <p:cxnSp>
+            <p:nvCxnSpPr>
+              <p:cNvPr id="140" name="Straight Connector 139">
+                <a:extLst>
+                  <a:ext uri="{FF2B5EF4-FFF2-40B4-BE49-F238E27FC236}">
+                    <a16:creationId xmlns:a16="http://schemas.microsoft.com/office/drawing/2014/main" id="{9F8C81FE-DF56-47DF-B5EC-20F0FD144C5E}"/>
+                  </a:ext>
+                </a:extLst>
+              </p:cNvPr>
+              <p:cNvCxnSpPr>
+                <a:cxnSpLocks/>
+              </p:cNvCxnSpPr>
+              <p:nvPr/>
+            </p:nvCxnSpPr>
+            <p:spPr>
+              <a:xfrm flipH="1">
+                <a:off x="4767902" y="781786"/>
+                <a:ext cx="1" cy="2541256"/>
+              </a:xfrm>
+              <a:prstGeom prst="line">
+                <a:avLst/>
+              </a:prstGeom>
+              <a:grpFill/>
+              <a:ln w="19050">
+                <a:solidFill>
+                  <a:srgbClr val="00B050"/>
+                </a:solidFill>
+                <a:prstDash val="sysDash"/>
+              </a:ln>
+              <a:effectLst/>
+            </p:spPr>
+            <p:style>
+              <a:lnRef idx="1">
+                <a:schemeClr val="accent1"/>
+              </a:lnRef>
+              <a:fillRef idx="2">
+                <a:schemeClr val="accent1"/>
+              </a:fillRef>
+              <a:effectRef idx="1">
+                <a:schemeClr val="accent1"/>
+              </a:effectRef>
+              <a:fontRef idx="minor">
+                <a:schemeClr val="dk1"/>
+              </a:fontRef>
+            </p:style>
+          </p:cxnSp>
+          <p:sp>
+            <p:nvSpPr>
+              <p:cNvPr id="141" name="Rectangle 140">
+                <a:extLst>
+                  <a:ext uri="{FF2B5EF4-FFF2-40B4-BE49-F238E27FC236}">
+                    <a16:creationId xmlns:a16="http://schemas.microsoft.com/office/drawing/2014/main" id="{A9B3C372-9EFF-42C7-AD10-C66DCBDDEA12}"/>
+                  </a:ext>
+                </a:extLst>
+              </p:cNvPr>
+              <p:cNvSpPr/>
+              <p:nvPr/>
+            </p:nvSpPr>
+            <p:spPr>
+              <a:xfrm>
+                <a:off x="4664978" y="1131601"/>
+                <a:ext cx="207385" cy="148860"/>
+              </a:xfrm>
+              <a:prstGeom prst="rect">
+                <a:avLst/>
+              </a:prstGeom>
+              <a:grpFill/>
+              <a:ln>
+                <a:solidFill>
+                  <a:srgbClr val="00B050"/>
+                </a:solidFill>
+              </a:ln>
+              <a:effectLst/>
+            </p:spPr>
+            <p:style>
+              <a:lnRef idx="1">
+                <a:schemeClr val="accent3"/>
+              </a:lnRef>
+              <a:fillRef idx="2">
+                <a:schemeClr val="accent3"/>
+              </a:fillRef>
+              <a:effectRef idx="1">
+                <a:schemeClr val="accent3"/>
+              </a:effectRef>
+              <a:fontRef idx="minor">
+                <a:schemeClr val="dk1"/>
+              </a:fontRef>
+            </p:style>
+            <p:txBody>
+              <a:bodyPr rtlCol="0" anchor="ctr"/>
+              <a:lstStyle/>
+              <a:p>
+                <a:pPr algn="ctr"/>
+                <a:endParaRPr lang="en-SG" sz="1400"/>
+              </a:p>
+            </p:txBody>
+          </p:sp>
+        </p:grpSp>
+        <p:sp>
+          <p:nvSpPr>
+            <p:cNvPr id="136" name="Rectangle 135">
+              <a:extLst>
+                <a:ext uri="{FF2B5EF4-FFF2-40B4-BE49-F238E27FC236}">
+                  <a16:creationId xmlns:a16="http://schemas.microsoft.com/office/drawing/2014/main" id="{62035E45-601B-4A17-B21E-86E7A7C6A024}"/>
+                </a:ext>
+              </a:extLst>
+            </p:cNvPr>
+            <p:cNvSpPr/>
+            <p:nvPr/>
+          </p:nvSpPr>
+          <p:spPr>
+            <a:xfrm>
+              <a:off x="3505200" y="1999803"/>
+              <a:ext cx="207385" cy="167652"/>
+            </a:xfrm>
+            <a:prstGeom prst="rect">
+              <a:avLst/>
+            </a:prstGeom>
+            <a:grpFill/>
+            <a:ln>
+              <a:solidFill>
+                <a:srgbClr val="00B050"/>
+              </a:solidFill>
+            </a:ln>
+            <a:effectLst/>
+          </p:spPr>
+          <p:style>
+            <a:lnRef idx="1">
+              <a:schemeClr val="accent3"/>
+            </a:lnRef>
+            <a:fillRef idx="2">
+              <a:schemeClr val="accent3"/>
+            </a:fillRef>
+            <a:effectRef idx="1">
+              <a:schemeClr val="accent3"/>
+            </a:effectRef>
+            <a:fontRef idx="minor">
+              <a:schemeClr val="dk1"/>
+            </a:fontRef>
+          </p:style>
+          <p:txBody>
+            <a:bodyPr rtlCol="0" anchor="ctr"/>
+            <a:lstStyle/>
+            <a:p>
+              <a:pPr algn="ctr"/>
+              <a:endParaRPr lang="en-SG" sz="1400"/>
+            </a:p>
+          </p:txBody>
+        </p:sp>
+        <p:sp>
+          <p:nvSpPr>
+            <p:cNvPr id="137" name="Rectangle 136">
+              <a:extLst>
+                <a:ext uri="{FF2B5EF4-FFF2-40B4-BE49-F238E27FC236}">
+                  <a16:creationId xmlns:a16="http://schemas.microsoft.com/office/drawing/2014/main" id="{09CB3DF7-7BCC-4D56-B1AB-EA90B8E75EC8}"/>
+                </a:ext>
+              </a:extLst>
+            </p:cNvPr>
+            <p:cNvSpPr/>
+            <p:nvPr/>
+          </p:nvSpPr>
+          <p:spPr>
+            <a:xfrm>
+              <a:off x="3505200" y="2612762"/>
+              <a:ext cx="207385" cy="154288"/>
+            </a:xfrm>
+            <a:prstGeom prst="rect">
+              <a:avLst/>
+            </a:prstGeom>
+            <a:grpFill/>
+            <a:ln>
+              <a:solidFill>
+                <a:srgbClr val="00B050"/>
+              </a:solidFill>
+            </a:ln>
+            <a:effectLst/>
+          </p:spPr>
+          <p:style>
+            <a:lnRef idx="1">
+              <a:schemeClr val="accent3"/>
+            </a:lnRef>
+            <a:fillRef idx="2">
+              <a:schemeClr val="accent3"/>
+            </a:fillRef>
+            <a:effectRef idx="1">
+              <a:schemeClr val="accent3"/>
+            </a:effectRef>
+            <a:fontRef idx="minor">
+              <a:schemeClr val="dk1"/>
+            </a:fontRef>
+          </p:style>
+          <p:txBody>
+            <a:bodyPr rtlCol="0" anchor="ctr"/>
+            <a:lstStyle/>
+            <a:p>
+              <a:pPr algn="ctr"/>
+              <a:endParaRPr lang="en-SG" sz="1400"/>
+            </a:p>
+          </p:txBody>
+        </p:sp>
+        <p:sp>
+          <p:nvSpPr>
+            <p:cNvPr id="138" name="Rectangle 137">
+              <a:extLst>
+                <a:ext uri="{FF2B5EF4-FFF2-40B4-BE49-F238E27FC236}">
+                  <a16:creationId xmlns:a16="http://schemas.microsoft.com/office/drawing/2014/main" id="{9F55CED4-9C68-4D3C-8714-E67025D9BE44}"/>
+                </a:ext>
+              </a:extLst>
+            </p:cNvPr>
+            <p:cNvSpPr/>
+            <p:nvPr/>
+          </p:nvSpPr>
+          <p:spPr>
+            <a:xfrm>
+              <a:off x="3526415" y="3200400"/>
+              <a:ext cx="207385" cy="176250"/>
+            </a:xfrm>
+            <a:prstGeom prst="rect">
+              <a:avLst/>
+            </a:prstGeom>
+            <a:grpFill/>
+            <a:ln>
+              <a:solidFill>
+                <a:srgbClr val="00B050"/>
+              </a:solidFill>
+            </a:ln>
+            <a:effectLst/>
+          </p:spPr>
+          <p:style>
+            <a:lnRef idx="1">
+              <a:schemeClr val="accent3"/>
+            </a:lnRef>
+            <a:fillRef idx="2">
+              <a:schemeClr val="accent3"/>
+            </a:fillRef>
+            <a:effectRef idx="1">
+              <a:schemeClr val="accent3"/>
+            </a:effectRef>
+            <a:fontRef idx="minor">
+              <a:schemeClr val="dk1"/>
+            </a:fontRef>
+          </p:style>
+          <p:txBody>
+            <a:bodyPr rtlCol="0" anchor="ctr"/>
+            <a:lstStyle/>
+            <a:p>
+              <a:pPr algn="ctr"/>
+              <a:endParaRPr lang="en-SG" sz="1400"/>
+            </a:p>
+          </p:txBody>
+        </p:sp>
+      </p:grpSp>
+      <p:cxnSp>
+        <p:nvCxnSpPr>
+          <p:cNvPr id="145" name="Straight Arrow Connector 144">
+            <a:extLst>
+              <a:ext uri="{FF2B5EF4-FFF2-40B4-BE49-F238E27FC236}">
+                <a16:creationId xmlns:a16="http://schemas.microsoft.com/office/drawing/2014/main" id="{ED629DB0-A1CB-4B23-B3D8-B112F8586954}"/>
+              </a:ext>
+            </a:extLst>
+          </p:cNvPr>
+          <p:cNvCxnSpPr>
+            <a:cxnSpLocks/>
+          </p:cNvCxnSpPr>
+          <p:nvPr/>
+        </p:nvCxnSpPr>
+        <p:spPr>
+          <a:xfrm>
+            <a:off x="3747933" y="1478280"/>
+            <a:ext cx="1786035" cy="0"/>
           </a:xfrm>
           <a:prstGeom prst="straightConnector1">
             <a:avLst/>
@@ -5299,10 +6838,10 @@
       </p:cxnSp>
       <p:cxnSp>
         <p:nvCxnSpPr>
-          <p:cNvPr id="60" name="Straight Arrow Connector 59">
+          <p:cNvPr id="146" name="Straight Arrow Connector 145">
             <a:extLst>
               <a:ext uri="{FF2B5EF4-FFF2-40B4-BE49-F238E27FC236}">
-                <a16:creationId xmlns:a16="http://schemas.microsoft.com/office/drawing/2014/main" id="{7C9F21BC-13A9-471F-825A-2621FD36355F}"/>
+                <a16:creationId xmlns:a16="http://schemas.microsoft.com/office/drawing/2014/main" id="{0CEC1849-17AC-4D53-BD60-B1B08B8F42E5}"/>
               </a:ext>
             </a:extLst>
           </p:cNvPr>
@@ -5312,9 +6851,9 @@
           <p:nvPr/>
         </p:nvCxnSpPr>
         <p:spPr>
-          <a:xfrm flipV="1">
-            <a:off x="7043991" y="3564914"/>
-            <a:ext cx="1470216" cy="6325"/>
+          <a:xfrm>
+            <a:off x="3733800" y="2019362"/>
+            <a:ext cx="1786035" cy="0"/>
           </a:xfrm>
           <a:prstGeom prst="straightConnector1">
             <a:avLst/>
@@ -5323,9 +6862,7 @@
             <a:solidFill>
               <a:srgbClr val="7030A0"/>
             </a:solidFill>
-            <a:prstDash val="sysDash"/>
-            <a:headEnd type="arrow" w="med" len="med"/>
-            <a:tailEnd type="none" w="med" len="med"/>
+            <a:tailEnd type="arrow"/>
           </a:ln>
         </p:spPr>
         <p:style>
@@ -5345,23 +6882,22 @@
       </p:cxnSp>
       <p:cxnSp>
         <p:nvCxnSpPr>
-          <p:cNvPr id="63" name="Straight Arrow Connector 62">
+          <p:cNvPr id="147" name="Straight Arrow Connector 146">
             <a:extLst>
               <a:ext uri="{FF2B5EF4-FFF2-40B4-BE49-F238E27FC236}">
-                <a16:creationId xmlns:a16="http://schemas.microsoft.com/office/drawing/2014/main" id="{7C9F21BC-13A9-471F-825A-2621FD36355F}"/>
+                <a16:creationId xmlns:a16="http://schemas.microsoft.com/office/drawing/2014/main" id="{DE3143AF-48BC-4306-917F-F5D5467047A3}"/>
               </a:ext>
             </a:extLst>
           </p:cNvPr>
           <p:cNvCxnSpPr>
             <a:cxnSpLocks/>
-            <a:endCxn id="49" idx="2"/>
           </p:cNvCxnSpPr>
           <p:nvPr/>
         </p:nvCxnSpPr>
         <p:spPr>
           <a:xfrm>
-            <a:off x="5675919" y="3733799"/>
-            <a:ext cx="1296056" cy="0"/>
+            <a:off x="3733800" y="2628962"/>
+            <a:ext cx="1786035" cy="0"/>
           </a:xfrm>
           <a:prstGeom prst="straightConnector1">
             <a:avLst/>
@@ -5369,6 +6905,468 @@
           <a:ln w="19050">
             <a:solidFill>
               <a:srgbClr val="7030A0"/>
+            </a:solidFill>
+            <a:tailEnd type="arrow"/>
+          </a:ln>
+        </p:spPr>
+        <p:style>
+          <a:lnRef idx="1">
+            <a:schemeClr val="accent1"/>
+          </a:lnRef>
+          <a:fillRef idx="0">
+            <a:schemeClr val="accent1"/>
+          </a:fillRef>
+          <a:effectRef idx="0">
+            <a:schemeClr val="accent1"/>
+          </a:effectRef>
+          <a:fontRef idx="minor">
+            <a:schemeClr val="tx1"/>
+          </a:fontRef>
+        </p:style>
+      </p:cxnSp>
+      <p:cxnSp>
+        <p:nvCxnSpPr>
+          <p:cNvPr id="148" name="Straight Arrow Connector 147">
+            <a:extLst>
+              <a:ext uri="{FF2B5EF4-FFF2-40B4-BE49-F238E27FC236}">
+                <a16:creationId xmlns:a16="http://schemas.microsoft.com/office/drawing/2014/main" id="{32A57B78-97F2-4E9A-BB76-0ED8D3E7190E}"/>
+              </a:ext>
+            </a:extLst>
+          </p:cNvPr>
+          <p:cNvCxnSpPr>
+            <a:cxnSpLocks/>
+          </p:cNvCxnSpPr>
+          <p:nvPr/>
+        </p:nvCxnSpPr>
+        <p:spPr>
+          <a:xfrm>
+            <a:off x="3758853" y="3238562"/>
+            <a:ext cx="1786035" cy="0"/>
+          </a:xfrm>
+          <a:prstGeom prst="straightConnector1">
+            <a:avLst/>
+          </a:prstGeom>
+          <a:ln w="19050">
+            <a:solidFill>
+              <a:srgbClr val="7030A0"/>
+            </a:solidFill>
+            <a:tailEnd type="arrow"/>
+          </a:ln>
+        </p:spPr>
+        <p:style>
+          <a:lnRef idx="1">
+            <a:schemeClr val="accent1"/>
+          </a:lnRef>
+          <a:fillRef idx="0">
+            <a:schemeClr val="accent1"/>
+          </a:fillRef>
+          <a:effectRef idx="0">
+            <a:schemeClr val="accent1"/>
+          </a:effectRef>
+          <a:fontRef idx="minor">
+            <a:schemeClr val="tx1"/>
+          </a:fontRef>
+        </p:style>
+      </p:cxnSp>
+      <p:sp>
+        <p:nvSpPr>
+          <p:cNvPr id="149" name="TextBox 148">
+            <a:extLst>
+              <a:ext uri="{FF2B5EF4-FFF2-40B4-BE49-F238E27FC236}">
+                <a16:creationId xmlns:a16="http://schemas.microsoft.com/office/drawing/2014/main" id="{AF185379-AA33-41EA-AF4E-B653A0CFD2CD}"/>
+              </a:ext>
+            </a:extLst>
+          </p:cNvPr>
+          <p:cNvSpPr txBox="1"/>
+          <p:nvPr/>
+        </p:nvSpPr>
+        <p:spPr>
+          <a:xfrm>
+            <a:off x="3685909" y="1232356"/>
+            <a:ext cx="1899551" cy="215444"/>
+          </a:xfrm>
+          <a:prstGeom prst="rect">
+            <a:avLst/>
+          </a:prstGeom>
+          <a:noFill/>
+        </p:spPr>
+        <p:txBody>
+          <a:bodyPr wrap="square" lIns="0" tIns="0" rIns="0" bIns="0" rtlCol="0">
+            <a:spAutoFit/>
+          </a:bodyPr>
+          <a:lstStyle>
+            <a:defPPr>
+              <a:defRPr lang="en-US"/>
+            </a:defPPr>
+            <a:lvl1pPr algn="r">
+              <a:defRPr sz="1400">
+                <a:solidFill>
+                  <a:srgbClr val="0070C0"/>
+                </a:solidFill>
+              </a:defRPr>
+            </a:lvl1pPr>
+          </a:lstStyle>
+          <a:p>
+            <a:pPr algn="ctr"/>
+            <a:r>
+              <a:rPr lang="en-US" dirty="0" err="1">
+                <a:solidFill>
+                  <a:srgbClr val="00B050"/>
+                </a:solidFill>
+              </a:rPr>
+              <a:t>getExpenseStats</a:t>
+            </a:r>
+            <a:r>
+              <a:rPr lang="en-US" dirty="0">
+                <a:solidFill>
+                  <a:srgbClr val="00B050"/>
+                </a:solidFill>
+              </a:rPr>
+              <a:t>()</a:t>
+            </a:r>
+          </a:p>
+        </p:txBody>
+      </p:sp>
+      <p:sp>
+        <p:nvSpPr>
+          <p:cNvPr id="150" name="TextBox 149">
+            <a:extLst>
+              <a:ext uri="{FF2B5EF4-FFF2-40B4-BE49-F238E27FC236}">
+                <a16:creationId xmlns:a16="http://schemas.microsoft.com/office/drawing/2014/main" id="{3ED1C67E-2EA1-4088-84B2-C17761F26A5B}"/>
+              </a:ext>
+            </a:extLst>
+          </p:cNvPr>
+          <p:cNvSpPr txBox="1"/>
+          <p:nvPr/>
+        </p:nvSpPr>
+        <p:spPr>
+          <a:xfrm>
+            <a:off x="3671776" y="1765756"/>
+            <a:ext cx="1899551" cy="215444"/>
+          </a:xfrm>
+          <a:prstGeom prst="rect">
+            <a:avLst/>
+          </a:prstGeom>
+          <a:noFill/>
+        </p:spPr>
+        <p:txBody>
+          <a:bodyPr wrap="square" lIns="0" tIns="0" rIns="0" bIns="0" rtlCol="0">
+            <a:spAutoFit/>
+          </a:bodyPr>
+          <a:lstStyle>
+            <a:defPPr>
+              <a:defRPr lang="en-US"/>
+            </a:defPPr>
+            <a:lvl1pPr algn="r">
+              <a:defRPr sz="1400">
+                <a:solidFill>
+                  <a:srgbClr val="0070C0"/>
+                </a:solidFill>
+              </a:defRPr>
+            </a:lvl1pPr>
+          </a:lstStyle>
+          <a:p>
+            <a:pPr algn="ctr"/>
+            <a:r>
+              <a:rPr lang="en-US" dirty="0" err="1">
+                <a:solidFill>
+                  <a:srgbClr val="00B050"/>
+                </a:solidFill>
+              </a:rPr>
+              <a:t>getStatsPeriod</a:t>
+            </a:r>
+            <a:r>
+              <a:rPr lang="en-US" dirty="0">
+                <a:solidFill>
+                  <a:srgbClr val="00B050"/>
+                </a:solidFill>
+              </a:rPr>
+              <a:t>()</a:t>
+            </a:r>
+          </a:p>
+        </p:txBody>
+      </p:sp>
+      <p:sp>
+        <p:nvSpPr>
+          <p:cNvPr id="151" name="TextBox 150">
+            <a:extLst>
+              <a:ext uri="{FF2B5EF4-FFF2-40B4-BE49-F238E27FC236}">
+                <a16:creationId xmlns:a16="http://schemas.microsoft.com/office/drawing/2014/main" id="{93766C0E-CFA1-4C4A-9E23-CE9EFEAC14E3}"/>
+              </a:ext>
+            </a:extLst>
+          </p:cNvPr>
+          <p:cNvSpPr txBox="1"/>
+          <p:nvPr/>
+        </p:nvSpPr>
+        <p:spPr>
+          <a:xfrm>
+            <a:off x="3671776" y="2375356"/>
+            <a:ext cx="1899551" cy="215444"/>
+          </a:xfrm>
+          <a:prstGeom prst="rect">
+            <a:avLst/>
+          </a:prstGeom>
+          <a:noFill/>
+        </p:spPr>
+        <p:txBody>
+          <a:bodyPr wrap="square" lIns="0" tIns="0" rIns="0" bIns="0" rtlCol="0">
+            <a:spAutoFit/>
+          </a:bodyPr>
+          <a:lstStyle>
+            <a:defPPr>
+              <a:defRPr lang="en-US"/>
+            </a:defPPr>
+            <a:lvl1pPr algn="r">
+              <a:defRPr sz="1400">
+                <a:solidFill>
+                  <a:srgbClr val="0070C0"/>
+                </a:solidFill>
+              </a:defRPr>
+            </a:lvl1pPr>
+          </a:lstStyle>
+          <a:p>
+            <a:pPr algn="ctr"/>
+            <a:r>
+              <a:rPr lang="en-US" dirty="0" err="1">
+                <a:solidFill>
+                  <a:srgbClr val="00B050"/>
+                </a:solidFill>
+              </a:rPr>
+              <a:t>getStatsMode</a:t>
+            </a:r>
+            <a:r>
+              <a:rPr lang="en-US" dirty="0">
+                <a:solidFill>
+                  <a:srgbClr val="00B050"/>
+                </a:solidFill>
+              </a:rPr>
+              <a:t>()</a:t>
+            </a:r>
+          </a:p>
+        </p:txBody>
+      </p:sp>
+      <p:sp>
+        <p:nvSpPr>
+          <p:cNvPr id="152" name="TextBox 151">
+            <a:extLst>
+              <a:ext uri="{FF2B5EF4-FFF2-40B4-BE49-F238E27FC236}">
+                <a16:creationId xmlns:a16="http://schemas.microsoft.com/office/drawing/2014/main" id="{3F26416B-EA87-48DC-B19A-1360DE5B27C4}"/>
+              </a:ext>
+            </a:extLst>
+          </p:cNvPr>
+          <p:cNvSpPr txBox="1"/>
+          <p:nvPr/>
+        </p:nvSpPr>
+        <p:spPr>
+          <a:xfrm>
+            <a:off x="3671776" y="2984956"/>
+            <a:ext cx="1899551" cy="215444"/>
+          </a:xfrm>
+          <a:prstGeom prst="rect">
+            <a:avLst/>
+          </a:prstGeom>
+          <a:noFill/>
+        </p:spPr>
+        <p:txBody>
+          <a:bodyPr wrap="square" lIns="0" tIns="0" rIns="0" bIns="0" rtlCol="0">
+            <a:spAutoFit/>
+          </a:bodyPr>
+          <a:lstStyle>
+            <a:defPPr>
+              <a:defRPr lang="en-US"/>
+            </a:defPPr>
+            <a:lvl1pPr algn="r">
+              <a:defRPr sz="1400">
+                <a:solidFill>
+                  <a:srgbClr val="0070C0"/>
+                </a:solidFill>
+              </a:defRPr>
+            </a:lvl1pPr>
+          </a:lstStyle>
+          <a:p>
+            <a:pPr algn="ctr"/>
+            <a:r>
+              <a:rPr lang="en-US" dirty="0" err="1">
+                <a:solidFill>
+                  <a:srgbClr val="00B050"/>
+                </a:solidFill>
+              </a:rPr>
+              <a:t>getPeriodAmount</a:t>
+            </a:r>
+            <a:r>
+              <a:rPr lang="en-US" dirty="0">
+                <a:solidFill>
+                  <a:srgbClr val="00B050"/>
+                </a:solidFill>
+              </a:rPr>
+              <a:t>()</a:t>
+            </a:r>
+          </a:p>
+        </p:txBody>
+      </p:sp>
+      <p:cxnSp>
+        <p:nvCxnSpPr>
+          <p:cNvPr id="153" name="Straight Arrow Connector 152">
+            <a:extLst>
+              <a:ext uri="{FF2B5EF4-FFF2-40B4-BE49-F238E27FC236}">
+                <a16:creationId xmlns:a16="http://schemas.microsoft.com/office/drawing/2014/main" id="{C29882B4-93C6-446C-B1B0-963D296B9488}"/>
+              </a:ext>
+            </a:extLst>
+          </p:cNvPr>
+          <p:cNvCxnSpPr>
+            <a:cxnSpLocks/>
+          </p:cNvCxnSpPr>
+          <p:nvPr/>
+        </p:nvCxnSpPr>
+        <p:spPr>
+          <a:xfrm>
+            <a:off x="3747933" y="1607820"/>
+            <a:ext cx="1803747" cy="0"/>
+          </a:xfrm>
+          <a:prstGeom prst="straightConnector1">
+            <a:avLst/>
+          </a:prstGeom>
+          <a:ln w="19050">
+            <a:solidFill>
+              <a:srgbClr val="00B050"/>
+            </a:solidFill>
+            <a:prstDash val="sysDash"/>
+            <a:headEnd type="arrow" w="med" len="med"/>
+            <a:tailEnd type="none" w="med" len="med"/>
+          </a:ln>
+        </p:spPr>
+        <p:style>
+          <a:lnRef idx="1">
+            <a:schemeClr val="accent1"/>
+          </a:lnRef>
+          <a:fillRef idx="0">
+            <a:schemeClr val="accent1"/>
+          </a:fillRef>
+          <a:effectRef idx="0">
+            <a:schemeClr val="accent1"/>
+          </a:effectRef>
+          <a:fontRef idx="minor">
+            <a:schemeClr val="tx1"/>
+          </a:fontRef>
+        </p:style>
+      </p:cxnSp>
+      <p:cxnSp>
+        <p:nvCxnSpPr>
+          <p:cNvPr id="154" name="Straight Arrow Connector 153">
+            <a:extLst>
+              <a:ext uri="{FF2B5EF4-FFF2-40B4-BE49-F238E27FC236}">
+                <a16:creationId xmlns:a16="http://schemas.microsoft.com/office/drawing/2014/main" id="{AF4FC2E2-5CB8-41F1-8AEA-7C34D6E86583}"/>
+              </a:ext>
+            </a:extLst>
+          </p:cNvPr>
+          <p:cNvCxnSpPr>
+            <a:cxnSpLocks/>
+          </p:cNvCxnSpPr>
+          <p:nvPr/>
+        </p:nvCxnSpPr>
+        <p:spPr>
+          <a:xfrm>
+            <a:off x="3733800" y="2148902"/>
+            <a:ext cx="1803747" cy="0"/>
+          </a:xfrm>
+          <a:prstGeom prst="straightConnector1">
+            <a:avLst/>
+          </a:prstGeom>
+          <a:ln w="19050">
+            <a:solidFill>
+              <a:srgbClr val="00B050"/>
+            </a:solidFill>
+            <a:prstDash val="sysDash"/>
+            <a:headEnd type="arrow" w="med" len="med"/>
+            <a:tailEnd type="none" w="med" len="med"/>
+          </a:ln>
+        </p:spPr>
+        <p:style>
+          <a:lnRef idx="1">
+            <a:schemeClr val="accent1"/>
+          </a:lnRef>
+          <a:fillRef idx="0">
+            <a:schemeClr val="accent1"/>
+          </a:fillRef>
+          <a:effectRef idx="0">
+            <a:schemeClr val="accent1"/>
+          </a:effectRef>
+          <a:fontRef idx="minor">
+            <a:schemeClr val="tx1"/>
+          </a:fontRef>
+        </p:style>
+      </p:cxnSp>
+      <p:cxnSp>
+        <p:nvCxnSpPr>
+          <p:cNvPr id="155" name="Straight Arrow Connector 154">
+            <a:extLst>
+              <a:ext uri="{FF2B5EF4-FFF2-40B4-BE49-F238E27FC236}">
+                <a16:creationId xmlns:a16="http://schemas.microsoft.com/office/drawing/2014/main" id="{AC3FB87D-1FAF-43E5-98DE-356332029B9C}"/>
+              </a:ext>
+            </a:extLst>
+          </p:cNvPr>
+          <p:cNvCxnSpPr>
+            <a:cxnSpLocks/>
+          </p:cNvCxnSpPr>
+          <p:nvPr/>
+        </p:nvCxnSpPr>
+        <p:spPr>
+          <a:xfrm>
+            <a:off x="3733800" y="2758502"/>
+            <a:ext cx="1803747" cy="0"/>
+          </a:xfrm>
+          <a:prstGeom prst="straightConnector1">
+            <a:avLst/>
+          </a:prstGeom>
+          <a:ln w="19050">
+            <a:solidFill>
+              <a:srgbClr val="00B050"/>
+            </a:solidFill>
+            <a:prstDash val="sysDash"/>
+            <a:headEnd type="arrow" w="med" len="med"/>
+            <a:tailEnd type="none" w="med" len="med"/>
+          </a:ln>
+        </p:spPr>
+        <p:style>
+          <a:lnRef idx="1">
+            <a:schemeClr val="accent1"/>
+          </a:lnRef>
+          <a:fillRef idx="0">
+            <a:schemeClr val="accent1"/>
+          </a:fillRef>
+          <a:effectRef idx="0">
+            <a:schemeClr val="accent1"/>
+          </a:effectRef>
+          <a:fontRef idx="minor">
+            <a:schemeClr val="tx1"/>
+          </a:fontRef>
+        </p:style>
+      </p:cxnSp>
+      <p:cxnSp>
+        <p:nvCxnSpPr>
+          <p:cNvPr id="156" name="Straight Arrow Connector 155">
+            <a:extLst>
+              <a:ext uri="{FF2B5EF4-FFF2-40B4-BE49-F238E27FC236}">
+                <a16:creationId xmlns:a16="http://schemas.microsoft.com/office/drawing/2014/main" id="{52B6A811-F069-46FD-BEDA-3B0D1B774CA5}"/>
+              </a:ext>
+            </a:extLst>
+          </p:cNvPr>
+          <p:cNvCxnSpPr>
+            <a:cxnSpLocks/>
+          </p:cNvCxnSpPr>
+          <p:nvPr/>
+        </p:nvCxnSpPr>
+        <p:spPr>
+          <a:xfrm>
+            <a:off x="3758853" y="3368102"/>
+            <a:ext cx="1803747" cy="0"/>
+          </a:xfrm>
+          <a:prstGeom prst="straightConnector1">
+            <a:avLst/>
+          </a:prstGeom>
+          <a:ln w="19050">
+            <a:solidFill>
+              <a:srgbClr val="00B050"/>
             </a:solidFill>
             <a:prstDash val="sysDash"/>
             <a:headEnd type="arrow" w="med" len="med"/>
@@ -5393,7 +7391,67 @@
     </p:spTree>
     <p:extLst>
       <p:ext uri="{BB962C8B-B14F-4D97-AF65-F5344CB8AC3E}">
-        <p14:creationId xmlns:p14="http://schemas.microsoft.com/office/powerpoint/2010/main" val="3945898909"/>
+        <p14:creationId xmlns:p14="http://schemas.microsoft.com/office/powerpoint/2010/main" val="563139535"/>
+      </p:ext>
+    </p:extLst>
+  </p:cSld>
+  <p:clrMapOvr>
+    <a:masterClrMapping/>
+  </p:clrMapOvr>
+</p:sld>
+</file>
+
+<file path=ppt/slides/slide2.xml><?xml version="1.0" encoding="utf-8"?>
+<p:sld xmlns:a="http://schemas.openxmlformats.org/drawingml/2006/main" xmlns:r="http://schemas.openxmlformats.org/officeDocument/2006/relationships" xmlns:p="http://schemas.openxmlformats.org/presentationml/2006/main">
+  <p:cSld>
+    <p:spTree>
+      <p:nvGrpSpPr>
+        <p:cNvPr id="1" name=""/>
+        <p:cNvGrpSpPr/>
+        <p:nvPr/>
+      </p:nvGrpSpPr>
+      <p:grpSpPr>
+        <a:xfrm>
+          <a:off x="0" y="0"/>
+          <a:ext cx="0" cy="0"/>
+          <a:chOff x="0" y="0"/>
+          <a:chExt cx="0" cy="0"/>
+        </a:xfrm>
+      </p:grpSpPr>
+      <p:pic>
+        <p:nvPicPr>
+          <p:cNvPr id="2" name="Picture 1">
+            <a:extLst>
+              <a:ext uri="{FF2B5EF4-FFF2-40B4-BE49-F238E27FC236}">
+                <a16:creationId xmlns:a16="http://schemas.microsoft.com/office/drawing/2014/main" id="{982BDF27-E583-4CF1-A80B-74967576C1B2}"/>
+              </a:ext>
+            </a:extLst>
+          </p:cNvPr>
+          <p:cNvPicPr>
+            <a:picLocks noChangeAspect="1"/>
+          </p:cNvPicPr>
+          <p:nvPr/>
+        </p:nvPicPr>
+        <p:blipFill>
+          <a:blip r:embed="rId2"/>
+          <a:stretch>
+            <a:fillRect/>
+          </a:stretch>
+        </p:blipFill>
+        <p:spPr>
+          <a:xfrm>
+            <a:off x="1394847" y="0"/>
+            <a:ext cx="6354305" cy="6858000"/>
+          </a:xfrm>
+          <a:prstGeom prst="rect">
+            <a:avLst/>
+          </a:prstGeom>
+        </p:spPr>
+      </p:pic>
+    </p:spTree>
+    <p:extLst>
+      <p:ext uri="{BB962C8B-B14F-4D97-AF65-F5344CB8AC3E}">
+        <p14:creationId xmlns:p14="http://schemas.microsoft.com/office/powerpoint/2010/main" val="3109007431"/>
       </p:ext>
     </p:extLst>
   </p:cSld>

</xml_diff>